<commit_message>
Created class diagramm, fixed remarks for presentation/diploma
</commit_message>
<xml_diff>
--- a/docs/master_diploma.pptx
+++ b/docs/master_diploma.pptx
@@ -235,7 +235,7 @@
           <a:p>
             <a:fld id="{4C53F058-B9DA-45CA-8B18-E02BE9515AEB}" type="datetimeFigureOut">
               <a:rPr lang="ru-RU" smtClean="0"/>
-              <a:t>04.06.2018</a:t>
+              <a:t>05.06.2018</a:t>
             </a:fld>
             <a:endParaRPr lang="ru-RU"/>
           </a:p>
@@ -1222,7 +1222,7 @@
           <a:p>
             <a:fld id="{22D385ED-1BC4-49F0-82B1-C9C89478EC16}" type="datetime1">
               <a:rPr lang="en-US" smtClean="0"/>
-              <a:t>6/4/2018</a:t>
+              <a:t>6/5/2018</a:t>
             </a:fld>
             <a:endParaRPr lang="en-US" dirty="0"/>
           </a:p>
@@ -1397,7 +1397,7 @@
           <a:p>
             <a:fld id="{28EEDC0B-91F0-4299-A7BC-FA130E62CC12}" type="datetime1">
               <a:rPr lang="en-US" smtClean="0"/>
-              <a:t>6/4/2018</a:t>
+              <a:t>6/5/2018</a:t>
             </a:fld>
             <a:endParaRPr lang="en-US" dirty="0"/>
           </a:p>
@@ -1582,7 +1582,7 @@
           <a:p>
             <a:fld id="{0682FF39-7F2E-4EA3-974F-0A07DF60CA97}" type="datetime1">
               <a:rPr lang="en-US" smtClean="0"/>
-              <a:t>6/4/2018</a:t>
+              <a:t>6/5/2018</a:t>
             </a:fld>
             <a:endParaRPr lang="en-US" dirty="0"/>
           </a:p>
@@ -1757,7 +1757,7 @@
           <a:p>
             <a:fld id="{E986CAC2-EABA-4F5A-B4A7-0237FA05F8A3}" type="datetime1">
               <a:rPr lang="en-US" smtClean="0"/>
-              <a:t>6/4/2018</a:t>
+              <a:t>6/5/2018</a:t>
             </a:fld>
             <a:endParaRPr lang="en-US" dirty="0"/>
           </a:p>
@@ -2008,7 +2008,7 @@
           <a:p>
             <a:fld id="{F477159B-9D75-4902-8644-DA09B430462B}" type="datetime1">
               <a:rPr lang="en-US" smtClean="0"/>
-              <a:t>6/4/2018</a:t>
+              <a:t>6/5/2018</a:t>
             </a:fld>
             <a:endParaRPr lang="en-US" dirty="0"/>
           </a:p>
@@ -2245,7 +2245,7 @@
           <a:p>
             <a:fld id="{25E1EB8F-7E6A-478A-92B7-7DC66EB7EA4B}" type="datetime1">
               <a:rPr lang="en-US" smtClean="0"/>
-              <a:t>6/4/2018</a:t>
+              <a:t>6/5/2018</a:t>
             </a:fld>
             <a:endParaRPr lang="en-US" dirty="0"/>
           </a:p>
@@ -2617,7 +2617,7 @@
           <a:p>
             <a:fld id="{A1687529-3A53-47AF-8E1F-9C0F03CB388E}" type="datetime1">
               <a:rPr lang="en-US" smtClean="0"/>
-              <a:t>6/4/2018</a:t>
+              <a:t>6/5/2018</a:t>
             </a:fld>
             <a:endParaRPr lang="en-US" dirty="0"/>
           </a:p>
@@ -2740,7 +2740,7 @@
           <a:p>
             <a:fld id="{BC3C1E02-6C9C-431C-9D73-C8F363B4D478}" type="datetime1">
               <a:rPr lang="en-US" smtClean="0"/>
-              <a:t>6/4/2018</a:t>
+              <a:t>6/5/2018</a:t>
             </a:fld>
             <a:endParaRPr lang="en-US" dirty="0"/>
           </a:p>
@@ -2840,7 +2840,7 @@
           <a:p>
             <a:fld id="{EA17FBE2-7E1B-4783-87A5-5458EA7426D3}" type="datetime1">
               <a:rPr lang="en-US" smtClean="0"/>
-              <a:t>6/4/2018</a:t>
+              <a:t>6/5/2018</a:t>
             </a:fld>
             <a:endParaRPr lang="en-US" dirty="0"/>
           </a:p>
@@ -3122,7 +3122,7 @@
           <a:p>
             <a:fld id="{244D7887-BC0C-4903-BF59-F17C24009D5F}" type="datetime1">
               <a:rPr lang="en-US" smtClean="0"/>
-              <a:t>6/4/2018</a:t>
+              <a:t>6/5/2018</a:t>
             </a:fld>
             <a:endParaRPr lang="en-US" dirty="0"/>
           </a:p>
@@ -3380,7 +3380,7 @@
           <a:p>
             <a:fld id="{AD3A21B4-4F4E-4D36-8A92-F4DDD18E409A}" type="datetime1">
               <a:rPr lang="en-US" smtClean="0"/>
-              <a:t>6/4/2018</a:t>
+              <a:t>6/5/2018</a:t>
             </a:fld>
             <a:endParaRPr lang="en-US" dirty="0"/>
           </a:p>
@@ -3598,7 +3598,7 @@
           <a:p>
             <a:fld id="{358AD0B1-C18F-41B7-8AB7-69C119DCF16C}" type="datetime1">
               <a:rPr lang="en-US" smtClean="0"/>
-              <a:t>6/4/2018</a:t>
+              <a:t>6/5/2018</a:t>
             </a:fld>
             <a:endParaRPr lang="en-US" dirty="0"/>
           </a:p>
@@ -4033,8 +4033,15 @@
           <a:p>
             <a:r>
               <a:rPr lang="ru-RU" sz="2800" b="1" dirty="0"/>
-              <a:t>МАГИСТЕРСКАЯ ДИССЕРТАЦИЯ</a:t>
-            </a:r>
+              <a:t>МАГИСТЕРСКАЯ </a:t>
+            </a:r>
+            <a:r>
+              <a:rPr lang="ru-RU" sz="2800" b="1" dirty="0" smtClean="0"/>
+              <a:t>ДИССЕРТАЦИЯ</a:t>
+            </a:r>
+            <a:br>
+              <a:rPr lang="ru-RU" sz="2800" b="1" dirty="0" smtClean="0"/>
+            </a:br>
             <a:r>
               <a:rPr lang="ru-RU" sz="2800" dirty="0"/>
               <a:t/>
@@ -4166,12 +4173,20 @@
           <a:p>
             <a:pPr algn="r"/>
             <a:r>
+              <a:rPr lang="ru-RU" sz="5600" smtClean="0">
+                <a:solidFill>
+                  <a:schemeClr val="tx1"/>
+                </a:solidFill>
+              </a:rPr>
+              <a:t>Шуланкина Елизавета </a:t>
+            </a:r>
+            <a:r>
               <a:rPr lang="ru-RU" sz="5600" dirty="0" smtClean="0">
                 <a:solidFill>
                   <a:schemeClr val="tx1"/>
                 </a:solidFill>
               </a:rPr>
-              <a:t>Шуланкина Елизавета Валерьевна</a:t>
+              <a:t>Валерьевна</a:t>
             </a:r>
           </a:p>
           <a:p>
@@ -6792,8 +6807,8 @@
           </a:p>
         </p:txBody>
       </p:sp>
-      <mc:AlternateContent xmlns:mc="http://schemas.openxmlformats.org/markup-compatibility/2006">
-        <mc:Choice xmlns:a14="http://schemas.microsoft.com/office/drawing/2010/main" Requires="a14">
+      <mc:AlternateContent xmlns:mc="http://schemas.openxmlformats.org/markup-compatibility/2006" xmlns:a14="http://schemas.microsoft.com/office/drawing/2010/main">
+        <mc:Choice Requires="a14">
           <p:sp>
             <p:nvSpPr>
               <p:cNvPr id="3" name="Content Placeholder 2"/>
@@ -6841,11 +6856,7 @@
                 </a:r>
                 <a:r>
                   <a:rPr lang="ru-RU" smtClean="0"/>
-                  <a:t>с </a:t>
-                </a:r>
-                <a:r>
-                  <a:rPr lang="ru-RU" smtClean="0"/>
-                  <a:t>обходами </a:t>
+                  <a:t>с обходами </a:t>
                 </a:r>
                 <a:r>
                   <a:rPr lang="ru-RU" dirty="0" smtClean="0"/>
@@ -6912,7 +6923,7 @@
             </p:txBody>
           </p:sp>
         </mc:Choice>
-        <mc:Fallback>
+        <mc:Fallback xmlns="">
           <p:sp>
             <p:nvSpPr>
               <p:cNvPr id="3" name="Content Placeholder 2"/>
@@ -7918,8 +7929,8 @@
           </a:p>
         </p:txBody>
       </p:sp>
-      <mc:AlternateContent xmlns:mc="http://schemas.openxmlformats.org/markup-compatibility/2006">
-        <mc:Choice xmlns:a14="http://schemas.microsoft.com/office/drawing/2010/main" Requires="a14">
+      <mc:AlternateContent xmlns:mc="http://schemas.openxmlformats.org/markup-compatibility/2006" xmlns:a14="http://schemas.microsoft.com/office/drawing/2010/main">
+        <mc:Choice Requires="a14">
           <p:sp>
             <p:nvSpPr>
               <p:cNvPr id="4" name="Rounded Rectangle 3"/>
@@ -8576,7 +8587,7 @@
             </p:txBody>
           </p:sp>
         </mc:Choice>
-        <mc:Fallback>
+        <mc:Fallback xmlns="">
           <p:sp>
             <p:nvSpPr>
               <p:cNvPr id="4" name="Rounded Rectangle 3"/>
@@ -8936,8 +8947,8 @@
           </a:p>
         </p:txBody>
       </p:sp>
-      <mc:AlternateContent xmlns:mc="http://schemas.openxmlformats.org/markup-compatibility/2006">
-        <mc:Choice xmlns:a14="http://schemas.microsoft.com/office/drawing/2010/main" Requires="a14">
+      <mc:AlternateContent xmlns:mc="http://schemas.openxmlformats.org/markup-compatibility/2006" xmlns:a14="http://schemas.microsoft.com/office/drawing/2010/main">
+        <mc:Choice Requires="a14">
           <p:sp>
             <p:nvSpPr>
               <p:cNvPr id="4" name="Content Placeholder 3"/>
@@ -9199,18 +9210,24 @@
                 <a14:m>
                   <m:oMath xmlns:m="http://schemas.openxmlformats.org/officeDocument/2006/math">
                     <m:r>
-                      <a:rPr lang="ru-RU" sz="2400" i="1"/>
+                      <a:rPr lang="ru-RU" sz="2400" i="1">
+                        <a:latin typeface="Cambria Math" panose="02040503050406030204" pitchFamily="18" charset="0"/>
+                      </a:rPr>
                       <m:t>𝐿</m:t>
                     </m:r>
                     <m:d>
                       <m:dPr>
                         <m:ctrlPr>
-                          <a:rPr lang="ru-RU" sz="2400" i="1"/>
+                          <a:rPr lang="ru-RU" sz="2400" i="1">
+                            <a:latin typeface="Cambria Math" panose="02040503050406030204" pitchFamily="18" charset="0"/>
+                          </a:rPr>
                         </m:ctrlPr>
                       </m:dPr>
                       <m:e>
                         <m:r>
-                          <a:rPr lang="ru-RU" sz="2400" i="1"/>
+                          <a:rPr lang="ru-RU" sz="2400" i="1">
+                            <a:latin typeface="Cambria Math" panose="02040503050406030204" pitchFamily="18" charset="0"/>
+                          </a:rPr>
                           <m:t>𝑖</m:t>
                         </m:r>
                       </m:e>
@@ -9668,7 +9685,7 @@
             </p:txBody>
           </p:sp>
         </mc:Choice>
-        <mc:Fallback>
+        <mc:Fallback xmlns="">
           <p:sp>
             <p:nvSpPr>
               <p:cNvPr id="4" name="Content Placeholder 3"/>
@@ -10253,7 +10270,7 @@
         </p:spPr>
         <p:txBody>
           <a:bodyPr>
-            <a:normAutofit fontScale="92500" lnSpcReduction="20000"/>
+            <a:normAutofit/>
           </a:bodyPr>
           <a:lstStyle/>
           <a:p>
@@ -10299,21 +10316,6 @@
                 </a:solidFill>
               </a:rPr>
               <a:t>.</a:t>
-            </a:r>
-          </a:p>
-          <a:p>
-            <a:pPr marL="0" indent="0" algn="just">
-              <a:buNone/>
-            </a:pPr>
-            <a:endParaRPr lang="ru-RU" dirty="0" smtClean="0"/>
-          </a:p>
-          <a:p>
-            <a:pPr marL="0" indent="0" algn="just">
-              <a:buNone/>
-            </a:pPr>
-            <a:r>
-              <a:rPr lang="ru-RU" sz="2600" dirty="0" smtClean="0"/>
-              <a:t>Задача о рюкзаке относится к числу широко известных задач комбинаторной оптимизации. Она часто используется на практике для решения таких проблем, как: погрузка груза, бюджетирование капитала, планирование проектов и выбор портфельных инвестиций.</a:t>
             </a:r>
           </a:p>
           <a:p>
@@ -19404,7 +19406,7 @@
         <p:spPr/>
         <p:txBody>
           <a:bodyPr>
-            <a:normAutofit lnSpcReduction="10000"/>
+            <a:normAutofit/>
           </a:bodyPr>
           <a:lstStyle/>
           <a:p>
@@ -19446,23 +19448,6 @@
               <a:buNone/>
             </a:pPr>
             <a:endParaRPr lang="ru-RU" dirty="0"/>
-          </a:p>
-          <a:p>
-            <a:pPr marL="0" indent="0" algn="just">
-              <a:buNone/>
-            </a:pPr>
-            <a:r>
-              <a:rPr lang="ru-RU" dirty="0" smtClean="0"/>
-              <a:t>Нахождение эффективного подхода к решению ЗОР</a:t>
-            </a:r>
-            <a:r>
-              <a:rPr lang="en-US" dirty="0" smtClean="0"/>
-              <a:t>/</a:t>
-            </a:r>
-            <a:r>
-              <a:rPr lang="ru-RU" dirty="0" smtClean="0"/>
-              <a:t>ЗОНР определенного класса позволит сократить временные затраты  и получить приемлемое решение в специфичной для класса задач области.</a:t>
-            </a:r>
           </a:p>
           <a:p>
             <a:pPr marL="0" indent="0" algn="just">
@@ -19558,6 +19543,52 @@
       </p:grpSpPr>
       <p:sp>
         <p:nvSpPr>
+          <p:cNvPr id="11" name="Rectangle 10"/>
+          <p:cNvSpPr/>
+          <p:nvPr/>
+        </p:nvSpPr>
+        <p:spPr>
+          <a:xfrm>
+            <a:off x="429027" y="5140008"/>
+            <a:ext cx="5806626" cy="1216341"/>
+          </a:xfrm>
+          <a:prstGeom prst="rect">
+            <a:avLst/>
+          </a:prstGeom>
+          <a:solidFill>
+            <a:schemeClr val="accent4">
+              <a:lumMod val="20000"/>
+              <a:lumOff val="80000"/>
+            </a:schemeClr>
+          </a:solidFill>
+        </p:spPr>
+        <p:style>
+          <a:lnRef idx="2">
+            <a:schemeClr val="accent4">
+              <a:shade val="50000"/>
+            </a:schemeClr>
+          </a:lnRef>
+          <a:fillRef idx="1">
+            <a:schemeClr val="accent4"/>
+          </a:fillRef>
+          <a:effectRef idx="0">
+            <a:schemeClr val="accent4"/>
+          </a:effectRef>
+          <a:fontRef idx="minor">
+            <a:schemeClr val="lt1"/>
+          </a:fontRef>
+        </p:style>
+        <p:txBody>
+          <a:bodyPr rtlCol="0" anchor="ctr"/>
+          <a:lstStyle/>
+          <a:p>
+            <a:pPr algn="ctr"/>
+            <a:endParaRPr lang="ru-RU"/>
+          </a:p>
+        </p:txBody>
+      </p:sp>
+      <p:sp>
+        <p:nvSpPr>
           <p:cNvPr id="2" name="Title 1"/>
           <p:cNvSpPr>
             <a:spLocks noGrp="1"/>
@@ -19609,7 +19640,7 @@
         </p:spPr>
         <p:txBody>
           <a:bodyPr>
-            <a:normAutofit fontScale="55000" lnSpcReduction="20000"/>
+            <a:normAutofit fontScale="25000" lnSpcReduction="20000"/>
           </a:bodyPr>
           <a:lstStyle/>
           <a:p>
@@ -19617,7 +19648,7 @@
               <a:buNone/>
             </a:pPr>
             <a:r>
-              <a:rPr lang="ru-RU" sz="3300" b="1" dirty="0" smtClean="0">
+              <a:rPr lang="ru-RU" sz="8000" b="1" dirty="0" smtClean="0">
                 <a:solidFill>
                   <a:schemeClr val="accent5">
                     <a:lumMod val="75000"/>
@@ -19632,45 +19663,65 @@
               <a:buNone/>
             </a:pPr>
             <a:r>
-              <a:rPr lang="ru-RU" sz="2900" dirty="0" smtClean="0"/>
-              <a:t>Для класса задач </a:t>
-            </a:r>
-            <a:r>
-              <a:rPr lang="ru-RU" sz="2900" b="1" dirty="0" smtClean="0">
+              <a:rPr lang="ru-RU" sz="8000" dirty="0" smtClean="0"/>
+              <a:t>Для задач </a:t>
+            </a:r>
+            <a:r>
+              <a:rPr lang="ru-RU" sz="8000" b="1" dirty="0" smtClean="0">
                 <a:solidFill>
                   <a:schemeClr val="accent5">
                     <a:lumMod val="75000"/>
                   </a:schemeClr>
                 </a:solidFill>
               </a:rPr>
-              <a:t>без корреляции </a:t>
-            </a:r>
-            <a:r>
-              <a:rPr lang="ru-RU" sz="2900" dirty="0" smtClean="0"/>
-              <a:t>и </a:t>
-            </a:r>
-            <a:r>
-              <a:rPr lang="ru-RU" sz="2900" b="1" dirty="0" smtClean="0">
+              <a:t>без корреляции</a:t>
+            </a:r>
+            <a:r>
+              <a:rPr lang="en-US" sz="8000" b="1" dirty="0">
                 <a:solidFill>
                   <a:schemeClr val="accent5">
                     <a:lumMod val="75000"/>
                   </a:schemeClr>
                 </a:solidFill>
               </a:rPr>
-              <a:t>с подсуммами </a:t>
-            </a:r>
-            <a:r>
-              <a:rPr lang="ru-RU" sz="2900" b="1" dirty="0" smtClean="0">
+              <a:t>,</a:t>
+            </a:r>
+            <a:r>
+              <a:rPr lang="ru-RU" sz="8000" dirty="0" smtClean="0"/>
+              <a:t> </a:t>
+            </a:r>
+            <a:r>
+              <a:rPr lang="ru-RU" sz="8000" b="1" dirty="0" smtClean="0">
+                <a:solidFill>
+                  <a:schemeClr val="accent5">
+                    <a:lumMod val="75000"/>
+                  </a:schemeClr>
+                </a:solidFill>
+              </a:rPr>
+              <a:t>с </a:t>
+            </a:r>
+            <a:r>
+              <a:rPr lang="ru-RU" sz="8000" b="1" dirty="0">
+                <a:solidFill>
+                  <a:schemeClr val="accent5">
+                    <a:lumMod val="75000"/>
+                  </a:schemeClr>
+                </a:solidFill>
+              </a:rPr>
+              <a:t>подсуммами и с слабой корреляцией </a:t>
+            </a:r>
+            <a:r>
+              <a:rPr lang="ru-RU" sz="8000" b="1" dirty="0" smtClean="0">
                 <a:solidFill>
                   <a:schemeClr val="accent6">
                     <a:lumMod val="75000"/>
                   </a:schemeClr>
                 </a:solidFill>
               </a:rPr>
-              <a:t>МВИГ с обходом в глубину </a:t>
-            </a:r>
-            <a:r>
-              <a:rPr lang="ru-RU" sz="2900" dirty="0" smtClean="0"/>
+              <a:t>МВИГ </a:t>
+            </a:r>
+            <a:r>
+              <a:rPr lang="ru-RU" sz="8000" dirty="0" smtClean="0"/>
               <a:t>показывает лучший результат по скорости решения (минимальное время выполнения в миллисекундах) среди прочих рассмотренных алгоритмов.</a:t>
             </a:r>
           </a:p>
@@ -19679,53 +19730,11 @@
               <a:buNone/>
             </a:pPr>
             <a:r>
-              <a:rPr lang="ru-RU" sz="2900" dirty="0" smtClean="0"/>
-              <a:t> Для задач </a:t>
-            </a:r>
-            <a:r>
-              <a:rPr lang="ru-RU" sz="2900" b="1" dirty="0" smtClean="0">
-                <a:solidFill>
-                  <a:schemeClr val="accent5">
-                    <a:lumMod val="75000"/>
-                  </a:schemeClr>
-                </a:solidFill>
-              </a:rPr>
-              <a:t>с слабой корреляцией </a:t>
-            </a:r>
-            <a:r>
-              <a:rPr lang="ru-RU" sz="2900" dirty="0" smtClean="0"/>
-              <a:t>лидирующую позицию занимает </a:t>
-            </a:r>
-            <a:r>
-              <a:rPr lang="ru-RU" sz="2900" b="1" dirty="0" smtClean="0">
-                <a:solidFill>
-                  <a:schemeClr val="accent6">
-                    <a:lumMod val="75000"/>
-                  </a:schemeClr>
-                </a:solidFill>
-              </a:rPr>
-              <a:t>МВИГ с обходом в ширину</a:t>
-            </a:r>
-            <a:r>
-              <a:rPr lang="ru-RU" sz="2900" dirty="0"/>
-              <a:t>.</a:t>
-            </a:r>
-            <a:endParaRPr lang="ru-RU" sz="2900" dirty="0" smtClean="0"/>
-          </a:p>
-          <a:p>
-            <a:pPr marL="0" indent="0" algn="just">
-              <a:buNone/>
-            </a:pPr>
-            <a:r>
-              <a:rPr lang="ru-RU" sz="2900" dirty="0"/>
-              <a:t>Д</a:t>
-            </a:r>
-            <a:r>
-              <a:rPr lang="ru-RU" sz="2900" dirty="0" smtClean="0"/>
-              <a:t>ля задач </a:t>
-            </a:r>
-            <a:r>
-              <a:rPr lang="ru-RU" sz="2900" b="1" dirty="0" smtClean="0">
+              <a:rPr lang="ru-RU" sz="8000" dirty="0" smtClean="0"/>
+              <a:t>Для задач </a:t>
+            </a:r>
+            <a:r>
+              <a:rPr lang="ru-RU" sz="8000" b="1" dirty="0" smtClean="0">
                 <a:solidFill>
                   <a:schemeClr val="accent5">
                     <a:lumMod val="75000"/>
@@ -19735,41 +19744,41 @@
               <a:t>с сильной корреляцией </a:t>
             </a:r>
             <a:r>
-              <a:rPr lang="ru-RU" sz="2900" dirty="0" smtClean="0"/>
+              <a:rPr lang="ru-RU" sz="8000" dirty="0" smtClean="0"/>
               <a:t>– </a:t>
             </a:r>
             <a:r>
-              <a:rPr lang="ru-RU" sz="2900" b="1" dirty="0">
+              <a:rPr lang="ru-RU" sz="8000" b="1" dirty="0">
                 <a:solidFill>
                   <a:schemeClr val="accent6">
                     <a:lumMod val="75000"/>
                   </a:schemeClr>
                 </a:solidFill>
               </a:rPr>
-              <a:t>табличный метод динамического </a:t>
-            </a:r>
-            <a:r>
-              <a:rPr lang="ru-RU" sz="2900" b="1" dirty="0" smtClean="0">
+              <a:t>табличный </a:t>
+            </a:r>
+            <a:r>
+              <a:rPr lang="ru-RU" sz="8000" b="1" dirty="0" smtClean="0">
                 <a:solidFill>
                   <a:schemeClr val="accent6">
                     <a:lumMod val="75000"/>
                   </a:schemeClr>
                 </a:solidFill>
               </a:rPr>
-              <a:t>программирования</a:t>
-            </a:r>
-            <a:r>
-              <a:rPr lang="ru-RU" sz="2900" b="1" dirty="0" smtClean="0"/>
+              <a:t>ДП</a:t>
+            </a:r>
+            <a:r>
+              <a:rPr lang="ru-RU" sz="8000" b="1" dirty="0" smtClean="0"/>
               <a:t>.</a:t>
             </a:r>
-            <a:endParaRPr lang="en-US" sz="2900" b="1" dirty="0" smtClean="0"/>
+            <a:endParaRPr lang="en-US" sz="8000" b="1" dirty="0" smtClean="0"/>
           </a:p>
           <a:p>
             <a:pPr marL="0" indent="0">
               <a:buNone/>
             </a:pPr>
             <a:r>
-              <a:rPr lang="ru-RU" sz="3300" b="1" dirty="0" smtClean="0">
+              <a:rPr lang="ru-RU" sz="8000" b="1" dirty="0" smtClean="0">
                 <a:solidFill>
                   <a:schemeClr val="accent5">
                     <a:lumMod val="75000"/>
@@ -19779,7 +19788,7 @@
               <a:t>Относительно </a:t>
             </a:r>
             <a:r>
-              <a:rPr lang="ru-RU" sz="3300" b="1" dirty="0">
+              <a:rPr lang="ru-RU" sz="8000" b="1" dirty="0">
                 <a:solidFill>
                   <a:schemeClr val="accent5">
                     <a:lumMod val="75000"/>
@@ -19789,7 +19798,7 @@
               <a:t>задач в </a:t>
             </a:r>
             <a:r>
-              <a:rPr lang="ru-RU" sz="3300" b="1" dirty="0" smtClean="0">
+              <a:rPr lang="ru-RU" sz="8000" b="1" dirty="0" smtClean="0">
                 <a:solidFill>
                   <a:schemeClr val="accent5">
                     <a:lumMod val="75000"/>
@@ -19799,7 +19808,7 @@
               <a:t>500 </a:t>
             </a:r>
             <a:r>
-              <a:rPr lang="ru-RU" sz="3300" b="1" dirty="0">
+              <a:rPr lang="ru-RU" sz="8000" b="1" dirty="0">
                 <a:solidFill>
                   <a:schemeClr val="accent5">
                     <a:lumMod val="75000"/>
@@ -19814,77 +19823,99 @@
               <a:buNone/>
             </a:pPr>
             <a:r>
-              <a:rPr lang="ru-RU" sz="2900" dirty="0" smtClean="0"/>
-              <a:t>Для </a:t>
-            </a:r>
-            <a:r>
-              <a:rPr lang="ru-RU" sz="2900" dirty="0"/>
-              <a:t>умеренных ЗОР размером в 500 предметов для всех классов тестовых задач лучшим по скорости решения среди прочих рассмотренных алгоритмов является </a:t>
-            </a:r>
-            <a:r>
-              <a:rPr lang="ru-RU" sz="3300" b="1" dirty="0">
+              <a:rPr lang="ru-RU" sz="8000" dirty="0" smtClean="0"/>
+              <a:t>Для всех </a:t>
+            </a:r>
+            <a:r>
+              <a:rPr lang="ru-RU" sz="8000" dirty="0"/>
+              <a:t>классов тестовых задач лучшим по скорости решения среди прочих рассмотренных алгоритмов является </a:t>
+            </a:r>
+            <a:r>
+              <a:rPr lang="ru-RU" sz="8000" b="1" dirty="0">
                 <a:solidFill>
                   <a:schemeClr val="accent6">
                     <a:lumMod val="75000"/>
                   </a:schemeClr>
                 </a:solidFill>
               </a:rPr>
-              <a:t>табличный метод динамического программирования</a:t>
-            </a:r>
-            <a:r>
-              <a:rPr lang="ru-RU" sz="2900" dirty="0" smtClean="0"/>
+              <a:t>табличный </a:t>
+            </a:r>
+            <a:r>
+              <a:rPr lang="ru-RU" sz="8000" b="1" dirty="0" smtClean="0">
+                <a:solidFill>
+                  <a:schemeClr val="accent6">
+                    <a:lumMod val="75000"/>
+                  </a:schemeClr>
+                </a:solidFill>
+              </a:rPr>
+              <a:t>ДП</a:t>
+            </a:r>
+            <a:r>
+              <a:rPr lang="ru-RU" sz="8000" dirty="0" smtClean="0"/>
               <a:t>.</a:t>
             </a:r>
+            <a:endParaRPr lang="en-US" sz="8000" dirty="0" smtClean="0"/>
           </a:p>
           <a:p>
             <a:pPr marL="0" indent="0" algn="just">
               <a:buNone/>
             </a:pPr>
-            <a:endParaRPr lang="ru-RU" sz="2900" dirty="0" smtClean="0"/>
+            <a:endParaRPr lang="ru-RU" sz="6400" dirty="0" smtClean="0"/>
           </a:p>
           <a:p>
             <a:pPr marL="0" indent="0" algn="just">
               <a:buNone/>
             </a:pPr>
             <a:r>
-              <a:rPr lang="en-US" sz="2900" dirty="0"/>
-              <a:t> </a:t>
-            </a:r>
-            <a:r>
-              <a:rPr lang="en-US" sz="2900" dirty="0" smtClean="0"/>
-              <a:t>       </a:t>
-            </a:r>
-            <a:r>
-              <a:rPr lang="ru-RU" sz="2900" dirty="0" smtClean="0"/>
-              <a:t>Стоит </a:t>
-            </a:r>
-            <a:r>
-              <a:rPr lang="ru-RU" sz="2900" dirty="0"/>
-              <a:t>учитывать, что при использовании МВИГ в больших задачах можно столкнуться с проблемой недостатка памяти, заложенной под хранение узлов, в результате чего алгоритм закончит работу с ошибкой о нехватке памяти</a:t>
-            </a:r>
-            <a:r>
-              <a:rPr lang="ru-RU" sz="2900" dirty="0" smtClean="0"/>
-              <a:t>. Для </a:t>
-            </a:r>
-            <a:r>
-              <a:rPr lang="ru-RU" sz="2900" dirty="0"/>
-              <a:t>сильно коррелированных задач и задач с подсуммами </a:t>
-            </a:r>
-            <a:r>
-              <a:rPr lang="ru-RU" sz="2900" dirty="0" smtClean="0"/>
-              <a:t>в </a:t>
-            </a:r>
-            <a:r>
-              <a:rPr lang="ru-RU" sz="2900" dirty="0"/>
-              <a:t>500 предметов МВИГ с обходом в ширину ни разу не выполнился </a:t>
-            </a:r>
-            <a:r>
-              <a:rPr lang="ru-RU" sz="2900" dirty="0" smtClean="0"/>
-              <a:t>успешно.</a:t>
-            </a:r>
-            <a:endParaRPr lang="ru-RU" sz="2900" dirty="0"/>
+              <a:rPr lang="ru-RU" sz="6400" dirty="0" smtClean="0"/>
+              <a:t>         </a:t>
+            </a:r>
           </a:p>
           <a:p>
+            <a:pPr marL="0" indent="0" algn="just">
+              <a:buNone/>
+            </a:pPr>
+            <a:r>
+              <a:rPr lang="ru-RU" sz="6400" dirty="0"/>
+              <a:t> </a:t>
+            </a:r>
+            <a:r>
+              <a:rPr lang="ru-RU" sz="6400" dirty="0" smtClean="0"/>
+              <a:t>        При использовании </a:t>
+            </a:r>
+            <a:r>
+              <a:rPr lang="ru-RU" sz="6400" dirty="0"/>
+              <a:t>МВИГ в больших задачах можно столкнуться с проблемой недостатка памяти, заложенной под хранение </a:t>
+            </a:r>
+            <a:r>
+              <a:rPr lang="ru-RU" sz="6400" dirty="0" smtClean="0"/>
+              <a:t>узлов. </a:t>
+            </a:r>
+            <a:r>
+              <a:rPr lang="ru-RU" sz="6400" dirty="0"/>
+              <a:t>Для сильно коррелированных задач и задач с подсуммами в 500 предметов МВИГ с обходом в ширину ни разу не выполнился успешно.</a:t>
+            </a:r>
+          </a:p>
+          <a:p>
+            <a:pPr marL="0" indent="0" algn="just">
+              <a:buNone/>
+            </a:pPr>
+            <a:endParaRPr lang="ru-RU" sz="1600" dirty="0" smtClean="0"/>
+          </a:p>
+          <a:p>
+            <a:pPr marL="0" indent="0" algn="just">
+              <a:buNone/>
+            </a:pPr>
+            <a:endParaRPr lang="ru-RU" sz="2600" dirty="0" smtClean="0"/>
+          </a:p>
+          <a:p>
+            <a:pPr marL="0" indent="0" algn="just">
+              <a:buNone/>
+            </a:pPr>
+            <a:r>
+              <a:rPr lang="ru-RU" sz="2600" dirty="0" smtClean="0"/>
+              <a:t>	</a:t>
+            </a:r>
             <a:endParaRPr lang="ru-RU" dirty="0"/>
           </a:p>
         </p:txBody>
@@ -23102,8 +23133,8 @@
         </p:blipFill>
         <p:spPr>
           <a:xfrm>
-            <a:off x="540560" y="5127990"/>
-            <a:ext cx="373840" cy="373840"/>
+            <a:off x="488397" y="5140008"/>
+            <a:ext cx="349803" cy="349803"/>
           </a:xfrm>
           <a:prstGeom prst="rect">
             <a:avLst/>
@@ -23157,7 +23188,12 @@
             <p:ph type="title"/>
           </p:nvPr>
         </p:nvSpPr>
-        <p:spPr/>
+        <p:spPr>
+          <a:xfrm>
+            <a:off x="838200" y="384113"/>
+            <a:ext cx="10515600" cy="1325563"/>
+          </a:xfrm>
+        </p:spPr>
         <p:txBody>
           <a:bodyPr/>
           <a:lstStyle/>
@@ -23185,13 +23221,13 @@
                 <p:ph sz="half" idx="1"/>
                 <p:extLst>
                   <p:ext uri="{D42A27DB-BD31-4B8C-83A1-F6EECF244321}">
-                    <p14:modId xmlns:p14="http://schemas.microsoft.com/office/powerpoint/2010/main" val="2918168940"/>
+                    <p14:modId xmlns:p14="http://schemas.microsoft.com/office/powerpoint/2010/main" val="2339098842"/>
                   </p:ext>
                 </p:extLst>
               </p:nvPr>
             </p:nvGraphicFramePr>
             <p:xfrm>
-              <a:off x="5828231" y="2027079"/>
+              <a:off x="5909856" y="2326133"/>
               <a:ext cx="6282144" cy="1463040"/>
             </p:xfrm>
             <a:graphic>
@@ -24380,13 +24416,13 @@
                 <p:ph sz="half" idx="1"/>
                 <p:extLst>
                   <p:ext uri="{D42A27DB-BD31-4B8C-83A1-F6EECF244321}">
-                    <p14:modId xmlns:p14="http://schemas.microsoft.com/office/powerpoint/2010/main" val="2918168940"/>
+                    <p14:modId xmlns:p14="http://schemas.microsoft.com/office/powerpoint/2010/main" val="2339098842"/>
                   </p:ext>
                 </p:extLst>
               </p:nvPr>
             </p:nvGraphicFramePr>
             <p:xfrm>
-              <a:off x="5828231" y="2027079"/>
+              <a:off x="5909856" y="2326133"/>
               <a:ext cx="6282144" cy="1463040"/>
             </p:xfrm>
             <a:graphic>
@@ -25200,7 +25236,7 @@
                         <a:blipFill rotWithShape="0">
                           <a:blip r:embed="rId3"/>
                           <a:stretch>
-                            <a:fillRect l="-273" t="-175556" r="-182240" b="-16667"/>
+                            <a:fillRect l="-273" t="-175556" r="-182514" b="-16667"/>
                           </a:stretch>
                         </a:blipFill>
                       </a:tcPr>
@@ -25502,7 +25538,7 @@
           <a:lstStyle/>
           <a:p>
             <a:r>
-              <a:rPr lang="ru-RU" smtClean="0"/>
+              <a:rPr lang="ru-RU" dirty="0" smtClean="0"/>
               <a:t>Шуланкина Е. В. " Исследование подходов к решению задачи о 0-1 рюкзаке и задачи о неограниченном рюкзаке"</a:t>
             </a:r>
             <a:endParaRPr lang="en-US" dirty="0"/>
@@ -25553,7 +25589,7 @@
             </p:spPr>
             <p:txBody>
               <a:bodyPr>
-                <a:normAutofit fontScale="62500" lnSpcReduction="20000"/>
+                <a:normAutofit fontScale="70000" lnSpcReduction="20000"/>
               </a:bodyPr>
               <a:lstStyle/>
               <a:p>
@@ -25562,11 +25598,7 @@
                 </a:pPr>
                 <a:r>
                   <a:rPr lang="ru-RU" sz="2900" dirty="0" smtClean="0"/>
-                  <a:t>Для класса </a:t>
-                </a:r>
-                <a:r>
-                  <a:rPr lang="ru-RU" sz="2900" dirty="0"/>
-                  <a:t>задач </a:t>
+                  <a:t>Для задач </a:t>
                 </a:r>
                 <a:r>
                   <a:rPr lang="ru-RU" sz="2900" b="1" dirty="0">
@@ -25580,8 +25612,44 @@
                 </a:r>
                 <a:r>
                   <a:rPr lang="ru-RU" sz="2900" dirty="0"/>
-                  <a:t>свойство периодичности достигается в </a:t>
+                  <a:t>свойство периодичности достигается </a:t>
                 </a:r>
+                <a:r>
+                  <a:rPr lang="ru-RU" sz="2900" dirty="0" smtClean="0"/>
+                  <a:t>в</a:t>
+                </a:r>
+                <a:r>
+                  <a:rPr lang="en-US" sz="2900" dirty="0" smtClean="0"/>
+                  <a:t> </a:t>
+                </a:r>
+                <a14:m>
+                  <m:oMath xmlns:m="http://schemas.openxmlformats.org/officeDocument/2006/math">
+                    <m:r>
+                      <a:rPr lang="en-US" sz="2900" b="1" i="0" smtClean="0">
+                        <a:solidFill>
+                          <a:schemeClr val="accent6">
+                            <a:lumMod val="75000"/>
+                          </a:schemeClr>
+                        </a:solidFill>
+                        <a:latin typeface="Cambria Math" panose="02040503050406030204" pitchFamily="18" charset="0"/>
+                        <a:ea typeface="Cambria Math" panose="02040503050406030204" pitchFamily="18" charset="0"/>
+                      </a:rPr>
+                      <m:t>≥</m:t>
+                    </m:r>
+                    <m:r>
+                      <a:rPr lang="en-US" sz="2900" b="1" i="1" smtClean="0">
+                        <a:solidFill>
+                          <a:schemeClr val="accent6">
+                            <a:lumMod val="75000"/>
+                          </a:schemeClr>
+                        </a:solidFill>
+                        <a:latin typeface="Cambria Math" panose="02040503050406030204" pitchFamily="18" charset="0"/>
+                        <a:ea typeface="Cambria Math" panose="02040503050406030204" pitchFamily="18" charset="0"/>
+                      </a:rPr>
+                      <m:t>𝟓𝟎</m:t>
+                    </m:r>
+                  </m:oMath>
+                </a14:m>
                 <a:r>
                   <a:rPr lang="ru-RU" sz="2900" b="1" dirty="0">
                     <a:solidFill>
@@ -25590,25 +25658,15 @@
                       </a:schemeClr>
                     </a:solidFill>
                   </a:rPr>
-                  <a:t>86,67%</a:t>
+                  <a:t>% </a:t>
+                </a:r>
+                <a:r>
+                  <a:rPr lang="ru-RU" sz="2900" dirty="0" smtClean="0"/>
+                  <a:t>экземпляров задач, </a:t>
                 </a:r>
                 <a:r>
                   <a:rPr lang="ru-RU" sz="2900" dirty="0"/>
-                  <a:t> от числа решенных экземпляров задач размером в 50 предметов и в </a:t>
-                </a:r>
-                <a:r>
-                  <a:rPr lang="ru-RU" sz="2900" b="1" dirty="0">
-                    <a:solidFill>
-                      <a:schemeClr val="accent6">
-                        <a:lumMod val="75000"/>
-                      </a:schemeClr>
-                    </a:solidFill>
-                  </a:rPr>
-                  <a:t>50% </a:t>
-                </a:r>
-                <a:r>
-                  <a:rPr lang="ru-RU" sz="2900" dirty="0"/>
-                  <a:t>от числа решенных экземпляров задач из 500 предметов, вследствие чего </a:t>
+                  <a:t>вследствие чего </a:t>
                 </a:r>
                 <a:r>
                   <a:rPr lang="ru-RU" sz="2900" b="1" dirty="0" smtClean="0">
@@ -25636,7 +25694,33 @@
                 </a:r>
                 <a:r>
                   <a:rPr lang="ru-RU" sz="2900" dirty="0"/>
-                  <a:t>лучший результат по времени выполнения. Для классов задач с </a:t>
+                  <a:t>лучший результат по времени выполнения</a:t>
+                </a:r>
+                <a:r>
+                  <a:rPr lang="ru-RU" sz="2900" dirty="0" smtClean="0"/>
+                  <a:t>.</a:t>
+                </a:r>
+                <a:endParaRPr lang="en-US" sz="2900" dirty="0" smtClean="0"/>
+              </a:p>
+              <a:p>
+                <a:pPr marL="0" indent="0" algn="just">
+                  <a:buNone/>
+                </a:pPr>
+                <a:r>
+                  <a:rPr lang="ru-RU" sz="2900" dirty="0" smtClean="0"/>
+                  <a:t> </a:t>
+                </a:r>
+                <a:r>
+                  <a:rPr lang="ru-RU" sz="2900" dirty="0"/>
+                  <a:t>Для </a:t>
+                </a:r>
+                <a:r>
+                  <a:rPr lang="ru-RU" sz="2900" dirty="0" smtClean="0"/>
+                  <a:t>задач </a:t>
+                </a:r>
+                <a:r>
+                  <a:rPr lang="ru-RU" sz="2900" dirty="0"/>
+                  <a:t>с </a:t>
                 </a:r>
                 <a:r>
                   <a:rPr lang="ru-RU" sz="2900" b="1" dirty="0">
@@ -25768,7 +25852,15 @@
                 </a:r>
                 <a:r>
                   <a:rPr lang="ru-RU" sz="2900" dirty="0"/>
-                  <a:t> от числа решенных экземпляров задач из 50 предметов, </a:t>
+                  <a:t> </a:t>
+                </a:r>
+                <a:r>
+                  <a:rPr lang="ru-RU" sz="2900" dirty="0" smtClean="0"/>
+                  <a:t>экземпляров </a:t>
+                </a:r>
+                <a:r>
+                  <a:rPr lang="ru-RU" sz="2900" dirty="0"/>
+                  <a:t>задач из 50 предметов, </a:t>
                 </a:r>
                 <a:r>
                   <a:rPr lang="ru-RU" sz="2900" dirty="0" smtClean="0"/>
@@ -25826,7 +25918,15 @@
                 </a:r>
                 <a:r>
                   <a:rPr lang="ru-RU" sz="2900" dirty="0"/>
-                  <a:t>быстрым алгоритмом по скорости решения является классический </a:t>
+                  <a:t>быстрым алгоритмом </a:t>
+                </a:r>
+                <a:r>
+                  <a:rPr lang="ru-RU" sz="2900" dirty="0" smtClean="0"/>
+                  <a:t>является </a:t>
+                </a:r>
+                <a:r>
+                  <a:rPr lang="ru-RU" sz="2900" dirty="0"/>
+                  <a:t>классический </a:t>
                 </a:r>
                 <a:r>
                   <a:rPr lang="ru-RU" sz="2900" b="1" dirty="0" smtClean="0">
@@ -25869,7 +25969,7 @@
               <a:blipFill rotWithShape="0">
                 <a:blip r:embed="rId4"/>
                 <a:stretch>
-                  <a:fillRect l="-1003" t="-2119" r="-892"/>
+                  <a:fillRect l="-1226" t="-2384" r="-1115"/>
                 </a:stretch>
               </a:blipFill>
             </p:spPr>
@@ -25896,7 +25996,7 @@
         </p:nvSpPr>
         <p:spPr>
           <a:xfrm>
-            <a:off x="10568649" y="1607167"/>
+            <a:off x="10621698" y="1966650"/>
             <a:ext cx="1570302" cy="369332"/>
           </a:xfrm>
           <a:prstGeom prst="rect">
@@ -25985,7 +26085,7 @@
         </p:nvSpPr>
         <p:spPr>
           <a:xfrm>
-            <a:off x="10423054" y="3982740"/>
+            <a:off x="10509665" y="3907521"/>
             <a:ext cx="1687321" cy="369332"/>
           </a:xfrm>
           <a:prstGeom prst="rect">
@@ -26032,13 +26132,13 @@
               <p:nvPr>
                 <p:extLst>
                   <p:ext uri="{D42A27DB-BD31-4B8C-83A1-F6EECF244321}">
-                    <p14:modId xmlns:p14="http://schemas.microsoft.com/office/powerpoint/2010/main" val="2774484856"/>
+                    <p14:modId xmlns:p14="http://schemas.microsoft.com/office/powerpoint/2010/main" val="3400946240"/>
                   </p:ext>
                 </p:extLst>
               </p:nvPr>
             </p:nvGraphicFramePr>
             <p:xfrm>
-              <a:off x="5828230" y="4352072"/>
+              <a:off x="5914841" y="4276853"/>
               <a:ext cx="6282145" cy="1463040"/>
             </p:xfrm>
             <a:graphic>
@@ -27226,13 +27326,13 @@
               <p:nvPr>
                 <p:extLst>
                   <p:ext uri="{D42A27DB-BD31-4B8C-83A1-F6EECF244321}">
-                    <p14:modId xmlns:p14="http://schemas.microsoft.com/office/powerpoint/2010/main" val="2774484856"/>
+                    <p14:modId xmlns:p14="http://schemas.microsoft.com/office/powerpoint/2010/main" val="3400946240"/>
                   </p:ext>
                 </p:extLst>
               </p:nvPr>
             </p:nvGraphicFramePr>
             <p:xfrm>
-              <a:off x="5828230" y="4352072"/>
+              <a:off x="5914841" y="4276853"/>
               <a:ext cx="6282145" cy="1463040"/>
             </p:xfrm>
             <a:graphic>
@@ -39137,11 +39237,11 @@
   <p:clrMapOvr>
     <a:masterClrMapping/>
   </p:clrMapOvr>
-  <mc:AlternateContent xmlns:mc="http://schemas.openxmlformats.org/markup-compatibility/2006">
-    <mc:Choice xmlns:p14="http://schemas.microsoft.com/office/powerpoint/2010/main" Requires="p14">
+  <mc:AlternateContent xmlns:mc="http://schemas.openxmlformats.org/markup-compatibility/2006" xmlns:p14="http://schemas.microsoft.com/office/powerpoint/2010/main">
+    <mc:Choice Requires="p14">
       <p:transition spd="slow" p14:dur="2000"/>
     </mc:Choice>
-    <mc:Fallback>
+    <mc:Fallback xmlns="">
       <p:transition spd="slow"/>
     </mc:Fallback>
   </mc:AlternateContent>
@@ -39289,11 +39389,11 @@
   <p:clrMapOvr>
     <a:masterClrMapping/>
   </p:clrMapOvr>
-  <mc:AlternateContent xmlns:mc="http://schemas.openxmlformats.org/markup-compatibility/2006">
-    <mc:Choice xmlns:p14="http://schemas.microsoft.com/office/powerpoint/2010/main" Requires="p14">
+  <mc:AlternateContent xmlns:mc="http://schemas.openxmlformats.org/markup-compatibility/2006" xmlns:p14="http://schemas.microsoft.com/office/powerpoint/2010/main">
+    <mc:Choice Requires="p14">
       <p:transition spd="slow" p14:dur="2000"/>
     </mc:Choice>
-    <mc:Fallback>
+    <mc:Fallback xmlns="">
       <p:transition spd="slow"/>
     </mc:Fallback>
   </mc:AlternateContent>
@@ -39534,11 +39634,11 @@
   <p:clrMapOvr>
     <a:masterClrMapping/>
   </p:clrMapOvr>
-  <mc:AlternateContent xmlns:mc="http://schemas.openxmlformats.org/markup-compatibility/2006">
-    <mc:Choice xmlns:p14="http://schemas.microsoft.com/office/powerpoint/2010/main" Requires="p14">
+  <mc:AlternateContent xmlns:mc="http://schemas.openxmlformats.org/markup-compatibility/2006" xmlns:p14="http://schemas.microsoft.com/office/powerpoint/2010/main">
+    <mc:Choice Requires="p14">
       <p:transition spd="slow" p14:dur="2000"/>
     </mc:Choice>
-    <mc:Fallback>
+    <mc:Fallback xmlns="">
       <p:transition spd="slow"/>
     </mc:Fallback>
   </mc:AlternateContent>
@@ -39650,11 +39750,11 @@
   <p:clrMapOvr>
     <a:masterClrMapping/>
   </p:clrMapOvr>
-  <mc:AlternateContent xmlns:mc="http://schemas.openxmlformats.org/markup-compatibility/2006">
-    <mc:Choice xmlns:p14="http://schemas.microsoft.com/office/powerpoint/2010/main" Requires="p14">
+  <mc:AlternateContent xmlns:mc="http://schemas.openxmlformats.org/markup-compatibility/2006" xmlns:p14="http://schemas.microsoft.com/office/powerpoint/2010/main">
+    <mc:Choice Requires="p14">
       <p:transition spd="slow" p14:dur="2000"/>
     </mc:Choice>
-    <mc:Fallback>
+    <mc:Fallback xmlns="">
       <p:transition spd="slow"/>
     </mc:Fallback>
   </mc:AlternateContent>
@@ -39861,16 +39961,20 @@
               <a:buAutoNum type="arabicPeriod"/>
             </a:pPr>
             <a:r>
+              <a:rPr lang="ru-RU" sz="2000" smtClean="0"/>
+              <a:t>Проведен</a:t>
+            </a:r>
+            <a:r>
+              <a:rPr lang="ru-RU" sz="2000" smtClean="0"/>
+              <a:t>ы эксперименты </a:t>
+            </a:r>
+            <a:r>
+              <a:rPr lang="ru-RU" sz="2000" smtClean="0"/>
+              <a:t>по </a:t>
+            </a:r>
+            <a:r>
               <a:rPr lang="ru-RU" sz="2000" dirty="0" smtClean="0"/>
-              <a:t>Проведено </a:t>
-            </a:r>
-            <a:r>
-              <a:rPr lang="en-US" sz="2000" dirty="0" smtClean="0"/>
-              <a:t>2 </a:t>
-            </a:r>
-            <a:r>
-              <a:rPr lang="ru-RU" sz="2000" dirty="0" smtClean="0"/>
-              <a:t>эксперимента по исследованию алгоритмов.</a:t>
+              <a:t>исследованию алгоритмов.</a:t>
             </a:r>
           </a:p>
           <a:p>
@@ -40319,7 +40423,15 @@
             </a:r>
             <a:r>
               <a:rPr lang="ru-RU" dirty="0"/>
-              <a:t>подбор лучшего среди исследуемых алгоритма </a:t>
+              <a:t>подбор лучшего </a:t>
+            </a:r>
+            <a:r>
+              <a:rPr lang="ru-RU" dirty="0" smtClean="0"/>
+              <a:t>(среди исследуемых) </a:t>
+            </a:r>
+            <a:r>
+              <a:rPr lang="ru-RU" dirty="0"/>
+              <a:t>алгоритма </a:t>
             </a:r>
             <a:r>
               <a:rPr lang="ru-RU" dirty="0" smtClean="0"/>
@@ -40622,11 +40734,11 @@
   <p:clrMapOvr>
     <a:masterClrMapping/>
   </p:clrMapOvr>
-  <mc:AlternateContent xmlns:mc="http://schemas.openxmlformats.org/markup-compatibility/2006">
-    <mc:Choice xmlns:p14="http://schemas.microsoft.com/office/powerpoint/2010/main" Requires="p14">
+  <mc:AlternateContent xmlns:mc="http://schemas.openxmlformats.org/markup-compatibility/2006" xmlns:p14="http://schemas.microsoft.com/office/powerpoint/2010/main">
+    <mc:Choice Requires="p14">
       <p:transition spd="slow" p14:dur="2000"/>
     </mc:Choice>
-    <mc:Fallback>
+    <mc:Fallback xmlns="">
       <p:transition spd="slow"/>
     </mc:Fallback>
   </mc:AlternateContent>
@@ -43286,17 +43398,7 @@
                   </a:schemeClr>
                 </a:solidFill>
               </a:rPr>
-              <a:t>Свойства задачи о </a:t>
-            </a:r>
-            <a:r>
-              <a:rPr lang="ru-RU" b="1" dirty="0" smtClean="0">
-                <a:solidFill>
-                  <a:schemeClr val="accent5">
-                    <a:lumMod val="75000"/>
-                  </a:schemeClr>
-                </a:solidFill>
-              </a:rPr>
-              <a:t>неограниченном </a:t>
+              <a:t>Свойства задачи о неограниченном </a:t>
             </a:r>
             <a:br>
               <a:rPr lang="ru-RU" b="1" dirty="0" smtClean="0">
@@ -43374,13 +43476,6 @@
               </a:rPr>
               <a:t>Доминирование</a:t>
             </a:r>
-            <a:endParaRPr lang="ru-RU" sz="3100" b="1" dirty="0" smtClean="0">
-              <a:solidFill>
-                <a:schemeClr val="accent5">
-                  <a:lumMod val="75000"/>
-                </a:schemeClr>
-              </a:solidFill>
-            </a:endParaRPr>
           </a:p>
           <a:p>
             <a:pPr marL="0" indent="0" algn="just">
@@ -43436,11 +43531,7 @@
             </a:r>
             <a:r>
               <a:rPr lang="en-US" dirty="0" smtClean="0"/>
-              <a:t>j</a:t>
-            </a:r>
-            <a:r>
-              <a:rPr lang="en-US" dirty="0" smtClean="0"/>
-              <a:t>.</a:t>
+              <a:t>j.</a:t>
             </a:r>
             <a:endParaRPr lang="ru-RU" dirty="0" smtClean="0"/>
           </a:p>

</xml_diff>

<commit_message>
Updated presentation, reviewed by family team :)
</commit_message>
<xml_diff>
--- a/docs/master_diploma.pptx
+++ b/docs/master_diploma.pptx
@@ -44,7 +44,7 @@
     <p:sldId id="297" r:id="rId35"/>
     <p:sldId id="303" r:id="rId36"/>
     <p:sldId id="356" r:id="rId37"/>
-    <p:sldId id="357" r:id="rId38"/>
+    <p:sldId id="361" r:id="rId38"/>
     <p:sldId id="358" r:id="rId39"/>
     <p:sldId id="359" r:id="rId40"/>
   </p:sldIdLst>
@@ -235,7 +235,7 @@
           <a:p>
             <a:fld id="{4C53F058-B9DA-45CA-8B18-E02BE9515AEB}" type="datetimeFigureOut">
               <a:rPr lang="ru-RU" smtClean="0"/>
-              <a:t>05.06.2018</a:t>
+              <a:t>06.06.2018</a:t>
             </a:fld>
             <a:endParaRPr lang="ru-RU"/>
           </a:p>
@@ -1222,7 +1222,7 @@
           <a:p>
             <a:fld id="{22D385ED-1BC4-49F0-82B1-C9C89478EC16}" type="datetime1">
               <a:rPr lang="en-US" smtClean="0"/>
-              <a:t>6/5/2018</a:t>
+              <a:t>6/6/2018</a:t>
             </a:fld>
             <a:endParaRPr lang="en-US" dirty="0"/>
           </a:p>
@@ -1397,7 +1397,7 @@
           <a:p>
             <a:fld id="{28EEDC0B-91F0-4299-A7BC-FA130E62CC12}" type="datetime1">
               <a:rPr lang="en-US" smtClean="0"/>
-              <a:t>6/5/2018</a:t>
+              <a:t>6/6/2018</a:t>
             </a:fld>
             <a:endParaRPr lang="en-US" dirty="0"/>
           </a:p>
@@ -1582,7 +1582,7 @@
           <a:p>
             <a:fld id="{0682FF39-7F2E-4EA3-974F-0A07DF60CA97}" type="datetime1">
               <a:rPr lang="en-US" smtClean="0"/>
-              <a:t>6/5/2018</a:t>
+              <a:t>6/6/2018</a:t>
             </a:fld>
             <a:endParaRPr lang="en-US" dirty="0"/>
           </a:p>
@@ -1757,7 +1757,7 @@
           <a:p>
             <a:fld id="{E986CAC2-EABA-4F5A-B4A7-0237FA05F8A3}" type="datetime1">
               <a:rPr lang="en-US" smtClean="0"/>
-              <a:t>6/5/2018</a:t>
+              <a:t>6/6/2018</a:t>
             </a:fld>
             <a:endParaRPr lang="en-US" dirty="0"/>
           </a:p>
@@ -2008,7 +2008,7 @@
           <a:p>
             <a:fld id="{F477159B-9D75-4902-8644-DA09B430462B}" type="datetime1">
               <a:rPr lang="en-US" smtClean="0"/>
-              <a:t>6/5/2018</a:t>
+              <a:t>6/6/2018</a:t>
             </a:fld>
             <a:endParaRPr lang="en-US" dirty="0"/>
           </a:p>
@@ -2245,7 +2245,7 @@
           <a:p>
             <a:fld id="{25E1EB8F-7E6A-478A-92B7-7DC66EB7EA4B}" type="datetime1">
               <a:rPr lang="en-US" smtClean="0"/>
-              <a:t>6/5/2018</a:t>
+              <a:t>6/6/2018</a:t>
             </a:fld>
             <a:endParaRPr lang="en-US" dirty="0"/>
           </a:p>
@@ -2617,7 +2617,7 @@
           <a:p>
             <a:fld id="{A1687529-3A53-47AF-8E1F-9C0F03CB388E}" type="datetime1">
               <a:rPr lang="en-US" smtClean="0"/>
-              <a:t>6/5/2018</a:t>
+              <a:t>6/6/2018</a:t>
             </a:fld>
             <a:endParaRPr lang="en-US" dirty="0"/>
           </a:p>
@@ -2740,7 +2740,7 @@
           <a:p>
             <a:fld id="{BC3C1E02-6C9C-431C-9D73-C8F363B4D478}" type="datetime1">
               <a:rPr lang="en-US" smtClean="0"/>
-              <a:t>6/5/2018</a:t>
+              <a:t>6/6/2018</a:t>
             </a:fld>
             <a:endParaRPr lang="en-US" dirty="0"/>
           </a:p>
@@ -2840,7 +2840,7 @@
           <a:p>
             <a:fld id="{EA17FBE2-7E1B-4783-87A5-5458EA7426D3}" type="datetime1">
               <a:rPr lang="en-US" smtClean="0"/>
-              <a:t>6/5/2018</a:t>
+              <a:t>6/6/2018</a:t>
             </a:fld>
             <a:endParaRPr lang="en-US" dirty="0"/>
           </a:p>
@@ -3122,7 +3122,7 @@
           <a:p>
             <a:fld id="{244D7887-BC0C-4903-BF59-F17C24009D5F}" type="datetime1">
               <a:rPr lang="en-US" smtClean="0"/>
-              <a:t>6/5/2018</a:t>
+              <a:t>6/6/2018</a:t>
             </a:fld>
             <a:endParaRPr lang="en-US" dirty="0"/>
           </a:p>
@@ -3380,7 +3380,7 @@
           <a:p>
             <a:fld id="{AD3A21B4-4F4E-4D36-8A92-F4DDD18E409A}" type="datetime1">
               <a:rPr lang="en-US" smtClean="0"/>
-              <a:t>6/5/2018</a:t>
+              <a:t>6/6/2018</a:t>
             </a:fld>
             <a:endParaRPr lang="en-US" dirty="0"/>
           </a:p>
@@ -3598,7 +3598,7 @@
           <a:p>
             <a:fld id="{358AD0B1-C18F-41B7-8AB7-69C119DCF16C}" type="datetime1">
               <a:rPr lang="en-US" smtClean="0"/>
-              <a:t>6/5/2018</a:t>
+              <a:t>6/6/2018</a:t>
             </a:fld>
             <a:endParaRPr lang="en-US" dirty="0"/>
           </a:p>
@@ -4173,20 +4173,12 @@
           <a:p>
             <a:pPr algn="r"/>
             <a:r>
-              <a:rPr lang="ru-RU" sz="5600" smtClean="0">
-                <a:solidFill>
-                  <a:schemeClr val="tx1"/>
-                </a:solidFill>
-              </a:rPr>
-              <a:t>Шуланкина Елизавета </a:t>
-            </a:r>
-            <a:r>
               <a:rPr lang="ru-RU" sz="5600" dirty="0" smtClean="0">
                 <a:solidFill>
                   <a:schemeClr val="tx1"/>
                 </a:solidFill>
               </a:rPr>
-              <a:t>Валерьевна</a:t>
+              <a:t>Шуланкина Елизавета Валерьевна</a:t>
             </a:r>
           </a:p>
           <a:p>
@@ -4321,8 +4313,8 @@
           </a:p>
         </p:txBody>
       </p:sp>
-      <mc:AlternateContent xmlns:mc="http://schemas.openxmlformats.org/markup-compatibility/2006" xmlns:a14="http://schemas.microsoft.com/office/drawing/2010/main">
-        <mc:Choice Requires="a14">
+      <mc:AlternateContent xmlns:mc="http://schemas.openxmlformats.org/markup-compatibility/2006">
+        <mc:Choice xmlns:a14="http://schemas.microsoft.com/office/drawing/2010/main" Requires="a14">
           <p:sp>
             <p:nvSpPr>
               <p:cNvPr id="3" name="Content Placeholder 2"/>
@@ -4390,19 +4382,31 @@
                 </a14:m>
                 <a:r>
                   <a:rPr lang="ru-RU" dirty="0" smtClean="0"/>
+                  <a:t>,</a:t>
+                </a:r>
+                <a:r>
+                  <a:rPr lang="ru-RU" dirty="0" smtClean="0"/>
                   <a:t> </a:t>
                 </a:r>
                 <a:r>
                   <a:rPr lang="ru-RU" dirty="0"/>
-                  <a:t>будет использовать только лучший предмет. </a:t>
+                  <a:t>будет использовать только лучший </a:t>
                 </a:r>
                 <a:r>
                   <a:rPr lang="ru-RU" dirty="0" smtClean="0"/>
-                  <a:t>Итак</a:t>
+                  <a:t>предмет для заполнения. Когда такая </a:t>
                 </a:r>
                 <a:r>
                   <a:rPr lang="ru-RU" dirty="0"/>
-                  <a:t>, когда такая емкость достигнута (например, методом динамического программирования), оптимальное решение может быть вычислено по следующей </a:t>
+                  <a:t>емкость </a:t>
+                </a:r>
+                <a:r>
+                  <a:rPr lang="ru-RU" dirty="0" smtClean="0"/>
+                  <a:t>достигнута, оптимальное </a:t>
+                </a:r>
+                <a:r>
+                  <a:rPr lang="ru-RU" dirty="0"/>
+                  <a:t>решение может быть вычислено по следующей </a:t>
                 </a:r>
                 <a:r>
                   <a:rPr lang="ru-RU" dirty="0" smtClean="0"/>
@@ -4585,7 +4589,7 @@
             </p:txBody>
           </p:sp>
         </mc:Choice>
-        <mc:Fallback xmlns="">
+        <mc:Fallback>
           <p:sp>
             <p:nvSpPr>
               <p:cNvPr id="3" name="Content Placeholder 2"/>
@@ -6807,8 +6811,8 @@
           </a:p>
         </p:txBody>
       </p:sp>
-      <mc:AlternateContent xmlns:mc="http://schemas.openxmlformats.org/markup-compatibility/2006" xmlns:a14="http://schemas.microsoft.com/office/drawing/2010/main">
-        <mc:Choice Requires="a14">
+      <mc:AlternateContent xmlns:mc="http://schemas.openxmlformats.org/markup-compatibility/2006">
+        <mc:Choice xmlns:a14="http://schemas.microsoft.com/office/drawing/2010/main" Requires="a14">
           <p:sp>
             <p:nvSpPr>
               <p:cNvPr id="3" name="Content Placeholder 2"/>
@@ -6852,15 +6856,7 @@
                 </a:pPr>
                 <a:r>
                   <a:rPr lang="ru-RU" dirty="0" smtClean="0"/>
-                  <a:t>Метод ветвей и границ </a:t>
-                </a:r>
-                <a:r>
-                  <a:rPr lang="ru-RU" smtClean="0"/>
-                  <a:t>с обходами </a:t>
-                </a:r>
-                <a:r>
-                  <a:rPr lang="ru-RU" dirty="0" smtClean="0"/>
-                  <a:t>в глубину</a:t>
+                  <a:t>Метод ветвей и границ с обходами в глубину</a:t>
                 </a:r>
                 <a:r>
                   <a:rPr lang="en-US" dirty="0" smtClean="0"/>
@@ -6868,7 +6864,15 @@
                 </a:r>
                 <a:r>
                   <a:rPr lang="ru-RU" dirty="0" smtClean="0"/>
-                  <a:t>ширину, использующий верхнюю границу по трем предметам с лучшим соотношением цены и веса (</a:t>
+                  <a:t>ширину, использующий верхнюю </a:t>
+                </a:r>
+                <a:r>
+                  <a:rPr lang="ru-RU" dirty="0" smtClean="0"/>
+                  <a:t>оценку по </a:t>
+                </a:r>
+                <a:r>
+                  <a:rPr lang="ru-RU" dirty="0" smtClean="0"/>
+                  <a:t>трем предметам с лучшим соотношением цены и веса (</a:t>
                 </a:r>
                 <a14:m>
                   <m:oMath xmlns:m="http://schemas.openxmlformats.org/officeDocument/2006/math">
@@ -6901,8 +6905,9 @@
                 </a14:m>
                 <a:r>
                   <a:rPr lang="ru-RU" dirty="0" smtClean="0"/>
-                  <a:t>), обход в глубину</a:t>
+                  <a:t>)</a:t>
                 </a:r>
+                <a:endParaRPr lang="ru-RU" dirty="0" smtClean="0"/>
               </a:p>
               <a:p>
                 <a:pPr marL="514350" lvl="0" indent="-514350">
@@ -6923,7 +6928,7 @@
             </p:txBody>
           </p:sp>
         </mc:Choice>
-        <mc:Fallback xmlns="">
+        <mc:Fallback>
           <p:sp>
             <p:nvSpPr>
               <p:cNvPr id="3" name="Content Placeholder 2"/>
@@ -8626,8 +8631,8 @@
           </p:sp>
         </mc:Fallback>
       </mc:AlternateContent>
-      <mc:AlternateContent xmlns:mc="http://schemas.openxmlformats.org/markup-compatibility/2006" xmlns:a14="http://schemas.microsoft.com/office/drawing/2010/main">
-        <mc:Choice Requires="a14">
+      <mc:AlternateContent xmlns:mc="http://schemas.openxmlformats.org/markup-compatibility/2006">
+        <mc:Choice xmlns:a14="http://schemas.microsoft.com/office/drawing/2010/main" Requires="a14">
           <p:sp>
             <p:nvSpPr>
               <p:cNvPr id="7" name="Rounded Rectangle 6"/>
@@ -8695,7 +8700,15 @@
                 </a14:m>
                 <a:r>
                   <a:rPr lang="ru-RU" dirty="0"/>
-                  <a:t> высчитывается в срезах по q емкостям. В конце каждого среза проверяется </a:t>
+                  <a:t> высчитывается в срезах по </a:t>
+                </a:r>
+                <a:r>
+                  <a:rPr lang="ru-RU" dirty="0" smtClean="0"/>
+                  <a:t>q. </a:t>
+                </a:r>
+                <a:r>
+                  <a:rPr lang="ru-RU" dirty="0"/>
+                  <a:t>В конце каждого среза проверяется </a:t>
                 </a:r>
                 <a:r>
                   <a:rPr lang="ru-RU" b="1" dirty="0">
@@ -8770,7 +8783,7 @@
             </p:txBody>
           </p:sp>
         </mc:Choice>
-        <mc:Fallback xmlns="">
+        <mc:Fallback>
           <p:sp>
             <p:nvSpPr>
               <p:cNvPr id="7" name="Rounded Rectangle 6"/>
@@ -8896,7 +8909,7 @@
 </file>
 
 <file path=ppt/slides/slide18.xml><?xml version="1.0" encoding="utf-8"?>
-<p:sld xmlns:a="http://schemas.openxmlformats.org/drawingml/2006/main" xmlns:r="http://schemas.openxmlformats.org/officeDocument/2006/relationships" xmlns:p="http://schemas.openxmlformats.org/presentationml/2006/main">
+<p:sld xmlns:a="http://schemas.openxmlformats.org/drawingml/2006/main" xmlns:r="http://schemas.openxmlformats.org/officeDocument/2006/relationships" xmlns:p="http://schemas.openxmlformats.org/presentationml/2006/main" show="0">
   <p:cSld>
     <p:spTree>
       <p:nvGrpSpPr>
@@ -9780,6 +9793,14 @@
   <p:clrMapOvr>
     <a:masterClrMapping/>
   </p:clrMapOvr>
+  <mc:AlternateContent xmlns:mc="http://schemas.openxmlformats.org/markup-compatibility/2006" xmlns:p14="http://schemas.microsoft.com/office/powerpoint/2010/main">
+    <mc:Choice Requires="p14">
+      <p:transition spd="slow" p14:dur="2000"/>
+    </mc:Choice>
+    <mc:Fallback xmlns="">
+      <p:transition spd="slow"/>
+    </mc:Fallback>
+  </mc:AlternateContent>
   <p:timing>
     <p:tnLst>
       <p:par>
@@ -10201,7 +10222,7 @@
 </file>
 
 <file path=ppt/slides/slide2.xml><?xml version="1.0" encoding="utf-8"?>
-<p:sld xmlns:a="http://schemas.openxmlformats.org/drawingml/2006/main" xmlns:r="http://schemas.openxmlformats.org/officeDocument/2006/relationships" xmlns:p="http://schemas.openxmlformats.org/presentationml/2006/main">
+<p:sld xmlns:a="http://schemas.openxmlformats.org/drawingml/2006/main" xmlns:r="http://schemas.openxmlformats.org/officeDocument/2006/relationships" xmlns:p="http://schemas.openxmlformats.org/presentationml/2006/main" show="0">
   <p:cSld>
     <p:spTree>
       <p:nvGrpSpPr>
@@ -10476,6 +10497,14 @@
   <p:clrMapOvr>
     <a:masterClrMapping/>
   </p:clrMapOvr>
+  <mc:AlternateContent xmlns:mc="http://schemas.openxmlformats.org/markup-compatibility/2006">
+    <mc:Choice xmlns:p14="http://schemas.microsoft.com/office/powerpoint/2010/main" Requires="p14">
+      <p:transition spd="slow" p14:dur="2000"/>
+    </mc:Choice>
+    <mc:Fallback>
+      <p:transition spd="slow"/>
+    </mc:Fallback>
+  </mc:AlternateContent>
   <p:timing>
     <p:tnLst>
       <p:par>
@@ -10503,8 +10532,8 @@
           <a:chExt cx="0" cy="0"/>
         </a:xfrm>
       </p:grpSpPr>
-      <mc:AlternateContent xmlns:mc="http://schemas.openxmlformats.org/markup-compatibility/2006" xmlns:a14="http://schemas.microsoft.com/office/drawing/2010/main">
-        <mc:Choice Requires="a14">
+      <mc:AlternateContent xmlns:mc="http://schemas.openxmlformats.org/markup-compatibility/2006">
+        <mc:Choice xmlns:a14="http://schemas.microsoft.com/office/drawing/2010/main" Requires="a14">
           <p:sp>
             <p:nvSpPr>
               <p:cNvPr id="2" name="Title 1"/>
@@ -10533,7 +10562,27 @@
                       </a:schemeClr>
                     </a:solidFill>
                   </a:rPr>
-                  <a:t>Метод ветвей и границ с верхней оценкой </a:t>
+                  <a:t>Метод ветвей и границ с </a:t>
+                </a:r>
+                <a:r>
+                  <a:rPr lang="ru-RU" b="1" dirty="0" smtClean="0">
+                    <a:solidFill>
+                      <a:schemeClr val="accent5">
+                        <a:lumMod val="75000"/>
+                      </a:schemeClr>
+                    </a:solidFill>
+                  </a:rPr>
+                  <a:t>верхней </a:t>
+                </a:r>
+                <a:r>
+                  <a:rPr lang="ru-RU" b="1" dirty="0" smtClean="0">
+                    <a:solidFill>
+                      <a:schemeClr val="accent5">
+                        <a:lumMod val="75000"/>
+                      </a:schemeClr>
+                    </a:solidFill>
+                  </a:rPr>
+                  <a:t>оценкой </a:t>
                 </a:r>
                 <a14:m>
                   <m:oMath xmlns:m="http://schemas.openxmlformats.org/officeDocument/2006/math">
@@ -10601,7 +10650,7 @@
             </p:txBody>
           </p:sp>
         </mc:Choice>
-        <mc:Fallback xmlns="">
+        <mc:Fallback>
           <p:sp>
             <p:nvSpPr>
               <p:cNvPr id="2" name="Title 1"/>
@@ -10639,8 +10688,8 @@
           </p:sp>
         </mc:Fallback>
       </mc:AlternateContent>
-      <mc:AlternateContent xmlns:mc="http://schemas.openxmlformats.org/markup-compatibility/2006" xmlns:a14="http://schemas.microsoft.com/office/drawing/2010/main">
-        <mc:Choice Requires="a14">
+      <mc:AlternateContent xmlns:mc="http://schemas.openxmlformats.org/markup-compatibility/2006">
+        <mc:Choice xmlns:a14="http://schemas.microsoft.com/office/drawing/2010/main" Requires="a14">
           <p:sp>
             <p:nvSpPr>
               <p:cNvPr id="3" name="Content Placeholder 2"/>
@@ -10673,7 +10722,15 @@
                 </a:r>
                 <a:r>
                   <a:rPr lang="ru-RU" sz="2600" dirty="0"/>
-                  <a:t>ветвей и границ состоит в перечислении каждой комбинации типов предметов, сохраняя нижнюю и верхнюю границы на оптимальном решении. Нижняя граница вычисляется для каждой текущей ветки набора предметов, используя жадную нижнюю оценку. </a:t>
+                  <a:t>ветвей и </a:t>
+                </a:r>
+                <a:r>
+                  <a:rPr lang="ru-RU" sz="2600" dirty="0" smtClean="0"/>
+                  <a:t>границ является модификацией полного перебора с исключением заведомо неоптимальных решений. </a:t>
+                </a:r>
+                <a:r>
+                  <a:rPr lang="ru-RU" sz="2600" dirty="0"/>
+                  <a:t>Нижняя граница вычисляется для каждой текущей ветки набора предметов, используя жадную нижнюю оценку. </a:t>
                 </a:r>
                 <a:endParaRPr lang="en-US" sz="2600" dirty="0" smtClean="0"/>
               </a:p>
@@ -10948,7 +11005,7 @@
             </p:txBody>
           </p:sp>
         </mc:Choice>
-        <mc:Fallback xmlns="">
+        <mc:Fallback>
           <p:sp>
             <p:nvSpPr>
               <p:cNvPr id="3" name="Content Placeholder 2"/>
@@ -10982,8 +11039,8 @@
           </p:sp>
         </mc:Fallback>
       </mc:AlternateContent>
-      <mc:AlternateContent xmlns:mc="http://schemas.openxmlformats.org/markup-compatibility/2006" xmlns:a14="http://schemas.microsoft.com/office/drawing/2010/main">
-        <mc:Choice Requires="a14">
+      <mc:AlternateContent xmlns:mc="http://schemas.openxmlformats.org/markup-compatibility/2006">
+        <mc:Choice xmlns:a14="http://schemas.microsoft.com/office/drawing/2010/main" Requires="a14">
           <p:sp>
             <p:nvSpPr>
               <p:cNvPr id="4" name="Content Placeholder 3"/>
@@ -10997,7 +11054,7 @@
             <p:spPr>
               <a:xfrm>
                 <a:off x="5956419" y="1027906"/>
-                <a:ext cx="5888052" cy="5456697"/>
+                <a:ext cx="6067514" cy="5456697"/>
               </a:xfrm>
             </p:spPr>
             <p:txBody>
@@ -11426,8 +11483,22 @@
                         <m:rPr>
                           <m:nor/>
                         </m:rPr>
-                        <a:rPr lang="en-US" sz="1900" dirty="0"/>
-                        <m:t> 1</m:t>
+                        <a:rPr lang="ru-RU" sz="1900" b="0" i="0" dirty="0" smtClean="0"/>
+                        <m:t>, </m:t>
+                      </m:r>
+                      <m:r>
+                        <m:rPr>
+                          <m:nor/>
+                        </m:rPr>
+                        <a:rPr lang="en-US" sz="1900" dirty="0" smtClean="0"/>
+                        <m:t>1</m:t>
+                      </m:r>
+                      <m:r>
+                        <m:rPr>
+                          <m:nor/>
+                        </m:rPr>
+                        <a:rPr lang="ru-RU" sz="1900" b="0" i="0" dirty="0" smtClean="0"/>
+                        <m:t>х по порядку</m:t>
                       </m:r>
                     </m:oMath>
                   </m:oMathPara>
@@ -11630,7 +11701,36 @@
                 </a:r>
                 <a:r>
                   <a:rPr lang="ru-RU" sz="1900" dirty="0" smtClean="0"/>
-                  <a:t> предметов 2 типа в рюкзаке с емкостью </a:t>
+                  <a:t> </a:t>
+                </a:r>
+                <a:r>
+                  <a:rPr lang="ru-RU" sz="1900" dirty="0" smtClean="0"/>
+                  <a:t>предметов, 2х </a:t>
+                </a:r>
+                <a14:m>
+                  <m:oMath xmlns:m="http://schemas.openxmlformats.org/officeDocument/2006/math">
+                    <m:r>
+                      <m:rPr>
+                        <m:nor/>
+                      </m:rPr>
+                      <a:rPr lang="ru-RU" sz="1900" dirty="0"/>
+                      <m:t>по порядку</m:t>
+                    </m:r>
+                  </m:oMath>
+                </a14:m>
+                <a:endParaRPr lang="ru-RU" sz="1900" dirty="0"/>
+              </a:p>
+              <a:p>
+                <a:pPr marL="0" indent="0" algn="ctr">
+                  <a:buNone/>
+                </a:pPr>
+                <a:r>
+                  <a:rPr lang="ru-RU" sz="1900" dirty="0" smtClean="0"/>
+                  <a:t>в </a:t>
+                </a:r>
+                <a:r>
+                  <a:rPr lang="ru-RU" sz="1900" dirty="0" smtClean="0"/>
+                  <a:t>рюкзаке с емкостью </a:t>
                 </a:r>
                 <a14:m>
                   <m:oMath xmlns:m="http://schemas.openxmlformats.org/officeDocument/2006/math">
@@ -12072,23 +12172,30 @@
                 </a:r>
                 <a:r>
                   <a:rPr lang="ru-RU" sz="1900" dirty="0" smtClean="0"/>
-                  <a:t>предметов </a:t>
+                  <a:t>предметов, 1х </a:t>
+                </a:r>
+                <a14:m>
+                  <m:oMath xmlns:m="http://schemas.openxmlformats.org/officeDocument/2006/math">
+                    <m:r>
+                      <m:rPr>
+                        <m:nor/>
+                      </m:rPr>
+                      <a:rPr lang="ru-RU" sz="1900" dirty="0"/>
+                      <m:t>по порядку</m:t>
+                    </m:r>
+                  </m:oMath>
+                </a14:m>
+                <a:r>
+                  <a:rPr lang="ru-RU" sz="1900" dirty="0" smtClean="0"/>
+                  <a:t> </a:t>
                 </a:r>
                 <a:r>
                   <a:rPr lang="ru-RU" sz="1900" dirty="0"/>
-                  <a:t>типа 1 и оставшуюся емкость с </a:t>
+                  <a:t>и оставшуюся емкость с </a:t>
                 </a:r>
                 <a:r>
                   <a:rPr lang="ru-RU" sz="1900" dirty="0" smtClean="0"/>
-                  <a:t>предметами </a:t>
-                </a:r>
-                <a:r>
-                  <a:rPr lang="ru-RU" sz="1900" dirty="0"/>
-                  <a:t>типа </a:t>
-                </a:r>
-                <a:r>
-                  <a:rPr lang="ru-RU" sz="1900" dirty="0" smtClean="0"/>
-                  <a:t>2</a:t>
+                  <a:t>предметами, 2ми по порядку</a:t>
                 </a:r>
                 <a:endParaRPr lang="en-US" sz="1900" dirty="0" smtClean="0"/>
               </a:p>
@@ -12398,14 +12505,18 @@
                   <a:buNone/>
                 </a:pPr>
                 <a:r>
-                  <a:rPr lang="ru-RU" sz="2100" dirty="0" smtClean="0"/>
+                  <a:rPr lang="ru-RU" sz="1900" dirty="0" smtClean="0"/>
                   <a:t>– </a:t>
                 </a:r>
                 <a:r>
-                  <a:rPr lang="ru-RU" sz="2100" dirty="0"/>
-                  <a:t>это прибыль, полученная использованием оставшейся емкости с предметом 3-его типа</a:t>
+                  <a:rPr lang="ru-RU" sz="1900" dirty="0"/>
+                  <a:t>это прибыль, полученная использованием оставшейся емкости с </a:t>
                 </a:r>
-                <a:endParaRPr lang="ru-RU" sz="2400" b="1" dirty="0">
+                <a:r>
+                  <a:rPr lang="ru-RU" sz="1900" dirty="0" smtClean="0"/>
+                  <a:t>предметом, 3м по порядку</a:t>
+                </a:r>
+                <a:endParaRPr lang="ru-RU" sz="2100" b="1" dirty="0">
                   <a:solidFill>
                     <a:schemeClr val="accent5">
                       <a:lumMod val="75000"/>
@@ -13030,7 +13141,15 @@
                 </a:r>
                 <a:r>
                   <a:rPr lang="ru-RU" sz="1900" dirty="0"/>
-                  <a:t>значение удаления некоторых предметов 1-ого типа из решения полученного из </a:t>
+                  <a:t>значение удаления некоторых </a:t>
+                </a:r>
+                <a:r>
+                  <a:rPr lang="ru-RU" sz="1900" dirty="0" smtClean="0"/>
+                  <a:t>1х предметов из </a:t>
+                </a:r>
+                <a:r>
+                  <a:rPr lang="ru-RU" sz="1900" dirty="0"/>
+                  <a:t>решения полученного из </a:t>
                 </a:r>
                 <a14:m>
                   <m:oMath xmlns:m="http://schemas.openxmlformats.org/officeDocument/2006/math">
@@ -13063,14 +13182,18 @@
                 </a14:m>
                 <a:r>
                   <a:rPr lang="ru-RU" sz="1900" dirty="0"/>
-                  <a:t> и замены их предметами 2-ого типа</a:t>
+                  <a:t> и замены </a:t>
+                </a:r>
+                <a:r>
+                  <a:rPr lang="ru-RU" sz="1900" dirty="0" smtClean="0"/>
+                  <a:t>их 2ми предметами</a:t>
                 </a:r>
                 <a:endParaRPr lang="ru-RU" sz="1900" b="1" dirty="0"/>
               </a:p>
             </p:txBody>
           </p:sp>
         </mc:Choice>
-        <mc:Fallback xmlns="">
+        <mc:Fallback>
           <p:sp>
             <p:nvSpPr>
               <p:cNvPr id="4" name="Content Placeholder 3"/>
@@ -13084,12 +13207,12 @@
             <p:spPr>
               <a:xfrm>
                 <a:off x="5956419" y="1027906"/>
-                <a:ext cx="5888052" cy="5456697"/>
+                <a:ext cx="6067514" cy="5456697"/>
               </a:xfrm>
               <a:blipFill rotWithShape="0">
                 <a:blip r:embed="rId4"/>
                 <a:stretch>
-                  <a:fillRect/>
+                  <a:fillRect l="-101" r="-402" b="-1117"/>
                 </a:stretch>
               </a:blipFill>
             </p:spPr>
@@ -14201,8 +14324,8 @@
           <a:chExt cx="0" cy="0"/>
         </a:xfrm>
       </p:grpSpPr>
-      <mc:AlternateContent xmlns:mc="http://schemas.openxmlformats.org/markup-compatibility/2006" xmlns:a14="http://schemas.microsoft.com/office/drawing/2010/main">
-        <mc:Choice Requires="a14">
+      <mc:AlternateContent xmlns:mc="http://schemas.openxmlformats.org/markup-compatibility/2006">
+        <mc:Choice xmlns:a14="http://schemas.microsoft.com/office/drawing/2010/main" Requires="a14">
           <p:sp>
             <p:nvSpPr>
               <p:cNvPr id="3" name="Content Placeholder 2"/>
@@ -14462,7 +14585,37 @@
                       </a:schemeClr>
                     </a:solidFill>
                   </a:rPr>
-                  <a:t>Задачи с слабой корреляцией </a:t>
+                  <a:t>Задачи с</a:t>
+                </a:r>
+                <a:r>
+                  <a:rPr lang="ru-RU" sz="2400" b="1" dirty="0">
+                    <a:solidFill>
+                      <a:schemeClr val="accent5">
+                        <a:lumMod val="75000"/>
+                      </a:schemeClr>
+                    </a:solidFill>
+                  </a:rPr>
+                  <a:t>о</a:t>
+                </a:r>
+                <a:r>
+                  <a:rPr lang="ru-RU" sz="2400" b="1" dirty="0" smtClean="0">
+                    <a:solidFill>
+                      <a:schemeClr val="accent5">
+                        <a:lumMod val="75000"/>
+                      </a:schemeClr>
+                    </a:solidFill>
+                  </a:rPr>
+                  <a:t> </a:t>
+                </a:r>
+                <a:r>
+                  <a:rPr lang="ru-RU" sz="2400" b="1" dirty="0" smtClean="0">
+                    <a:solidFill>
+                      <a:schemeClr val="accent5">
+                        <a:lumMod val="75000"/>
+                      </a:schemeClr>
+                    </a:solidFill>
+                  </a:rPr>
+                  <a:t>слабой корреляцией </a:t>
                 </a:r>
                 <a:r>
                   <a:rPr lang="ru-RU" sz="1600" dirty="0" smtClean="0"/>
@@ -15615,7 +15768,7 @@
             </p:txBody>
           </p:sp>
         </mc:Choice>
-        <mc:Fallback xmlns="">
+        <mc:Fallback>
           <p:sp>
             <p:nvSpPr>
               <p:cNvPr id="3" name="Content Placeholder 2"/>
@@ -18177,8 +18330,8 @@
           </a:p>
         </p:txBody>
       </p:sp>
-      <mc:AlternateContent xmlns:mc="http://schemas.openxmlformats.org/markup-compatibility/2006" xmlns:a14="http://schemas.microsoft.com/office/drawing/2010/main">
-        <mc:Choice Requires="a14">
+      <mc:AlternateContent xmlns:mc="http://schemas.openxmlformats.org/markup-compatibility/2006">
+        <mc:Choice xmlns:a14="http://schemas.microsoft.com/office/drawing/2010/main" Requires="a14">
           <p:graphicFrame>
             <p:nvGraphicFramePr>
               <p:cNvPr id="3" name="Table 2"/>
@@ -18188,7 +18341,7 @@
               <p:nvPr>
                 <p:extLst>
                   <p:ext uri="{D42A27DB-BD31-4B8C-83A1-F6EECF244321}">
-                    <p14:modId xmlns:p14="http://schemas.microsoft.com/office/powerpoint/2010/main" val="3918765354"/>
+                    <p14:modId xmlns:p14="http://schemas.microsoft.com/office/powerpoint/2010/main" val="1085576201"/>
                   </p:ext>
                 </p:extLst>
               </p:nvPr>
@@ -18249,7 +18402,7 @@
                                 </a:schemeClr>
                               </a:solidFill>
                             </a:rPr>
-                            <a:t>с</a:t>
+                            <a:t>со</a:t>
                           </a:r>
                           <a:r>
                             <a:rPr lang="ru-RU" sz="2000" b="1" baseline="0" dirty="0" smtClean="0">
@@ -18392,7 +18545,7 @@
             </a:graphic>
           </p:graphicFrame>
         </mc:Choice>
-        <mc:Fallback xmlns="">
+        <mc:Fallback>
           <p:graphicFrame>
             <p:nvGraphicFramePr>
               <p:cNvPr id="3" name="Table 2"/>
@@ -18402,7 +18555,7 @@
               <p:nvPr>
                 <p:extLst>
                   <p:ext uri="{D42A27DB-BD31-4B8C-83A1-F6EECF244321}">
-                    <p14:modId xmlns:p14="http://schemas.microsoft.com/office/powerpoint/2010/main" val="3918765354"/>
+                    <p14:modId xmlns:p14="http://schemas.microsoft.com/office/powerpoint/2010/main" val="1085576201"/>
                   </p:ext>
                 </p:extLst>
               </p:nvPr>
@@ -18463,7 +18616,7 @@
                                 </a:schemeClr>
                               </a:solidFill>
                             </a:rPr>
-                            <a:t>с</a:t>
+                            <a:t>со</a:t>
                           </a:r>
                           <a:r>
                             <a:rPr lang="ru-RU" sz="2000" b="1" baseline="0" dirty="0" smtClean="0">
@@ -19007,8 +19160,8 @@
           </a:p>
         </p:txBody>
       </p:sp>
-      <mc:AlternateContent xmlns:mc="http://schemas.openxmlformats.org/markup-compatibility/2006" xmlns:a14="http://schemas.microsoft.com/office/drawing/2010/main">
-        <mc:Choice Requires="a14">
+      <mc:AlternateContent xmlns:mc="http://schemas.openxmlformats.org/markup-compatibility/2006">
+        <mc:Choice xmlns:a14="http://schemas.microsoft.com/office/drawing/2010/main" Requires="a14">
           <p:sp>
             <p:nvSpPr>
               <p:cNvPr id="3" name="Content Placeholder 2"/>
@@ -19046,7 +19199,19 @@
                 </a:pPr>
                 <a:r>
                   <a:rPr lang="ru-RU" sz="3800" dirty="0"/>
-                  <a:t>Среди всех алгоритмов для каждого экземпляра класса находятся:</a:t>
+                  <a:t>Среди всех алгоритмов для каждого экземпляра </a:t>
+                </a:r>
+                <a:r>
+                  <a:rPr lang="ru-RU" sz="3800" dirty="0" smtClean="0"/>
+                  <a:t>задачи </a:t>
+                </a:r>
+                <a:r>
+                  <a:rPr lang="ru-RU" sz="3800" dirty="0" smtClean="0"/>
+                  <a:t>класса </a:t>
+                </a:r>
+                <a:r>
+                  <a:rPr lang="ru-RU" sz="3800" dirty="0"/>
+                  <a:t>находятся:</a:t>
                 </a:r>
               </a:p>
               <a:p>
@@ -19112,7 +19277,31 @@
                 </a:r>
                 <a:r>
                   <a:rPr lang="ru-RU" sz="3800" dirty="0"/>
-                  <a:t>всех лучших алгоритмов для текущего экземпляра задачи выбираются лучшие алгоритмы для конкретного класса задач по максимальному количеству минимальных медиан времени выполнения и максимальному количеству минимальных средний отклонений</a:t>
+                  <a:t>всех лучших алгоритмов для </a:t>
+                </a:r>
+                <a:r>
+                  <a:rPr lang="ru-RU" sz="3800" dirty="0" smtClean="0"/>
+                  <a:t>экземпляров задач класса </a:t>
+                </a:r>
+                <a:r>
+                  <a:rPr lang="ru-RU" sz="3800" dirty="0"/>
+                  <a:t>выбираются лучшие алгоритмы для </a:t>
+                </a:r>
+                <a:r>
+                  <a:rPr lang="ru-RU" sz="3800" dirty="0" smtClean="0"/>
+                  <a:t>всего </a:t>
+                </a:r>
+                <a:r>
+                  <a:rPr lang="ru-RU" sz="3800" dirty="0"/>
+                  <a:t>класса </a:t>
+                </a:r>
+                <a:r>
+                  <a:rPr lang="ru-RU" sz="3800" dirty="0" smtClean="0"/>
+                  <a:t>по </a:t>
+                </a:r>
+                <a:r>
+                  <a:rPr lang="ru-RU" sz="3800" dirty="0"/>
+                  <a:t>максимальному количеству минимальных медиан времени выполнения и максимальному количеству минимальных средний отклонений</a:t>
                 </a:r>
                 <a:r>
                   <a:rPr lang="ru-RU" sz="3800" dirty="0" smtClean="0"/>
@@ -19244,7 +19433,7 @@
             </p:txBody>
           </p:sp>
         </mc:Choice>
-        <mc:Fallback xmlns="">
+        <mc:Fallback>
           <p:sp>
             <p:nvSpPr>
               <p:cNvPr id="3" name="Content Placeholder 2"/>
@@ -19708,7 +19897,27 @@
                   </a:schemeClr>
                 </a:solidFill>
               </a:rPr>
-              <a:t>подсуммами и с слабой корреляцией </a:t>
+              <a:t>подсуммами и </a:t>
+            </a:r>
+            <a:r>
+              <a:rPr lang="ru-RU" sz="8000" b="1" dirty="0" smtClean="0">
+                <a:solidFill>
+                  <a:schemeClr val="accent5">
+                    <a:lumMod val="75000"/>
+                  </a:schemeClr>
+                </a:solidFill>
+              </a:rPr>
+              <a:t>со </a:t>
+            </a:r>
+            <a:r>
+              <a:rPr lang="ru-RU" sz="8000" b="1" dirty="0">
+                <a:solidFill>
+                  <a:schemeClr val="accent5">
+                    <a:lumMod val="75000"/>
+                  </a:schemeClr>
+                </a:solidFill>
+              </a:rPr>
+              <a:t>слабой корреляцией </a:t>
             </a:r>
             <a:r>
               <a:rPr lang="ru-RU" sz="8000" b="1" dirty="0" smtClean="0">
@@ -19976,7 +20185,7 @@
           <p:nvPr>
             <p:extLst>
               <p:ext uri="{D42A27DB-BD31-4B8C-83A1-F6EECF244321}">
-                <p14:modId xmlns:p14="http://schemas.microsoft.com/office/powerpoint/2010/main" val="1204795776"/>
+                <p14:modId xmlns:p14="http://schemas.microsoft.com/office/powerpoint/2010/main" val="3837305050"/>
               </p:ext>
             </p:extLst>
           </p:nvPr>
@@ -20709,7 +20918,7 @@
                           </a:solidFill>
                           <a:effectLst/>
                         </a:rPr>
-                        <a:t>с </a:t>
+                        <a:t>со </a:t>
                       </a:r>
                       <a:r>
                         <a:rPr lang="ru-RU" sz="1400" b="0" dirty="0">
@@ -21668,7 +21877,7 @@
           <p:nvPr>
             <p:extLst>
               <p:ext uri="{D42A27DB-BD31-4B8C-83A1-F6EECF244321}">
-                <p14:modId xmlns:p14="http://schemas.microsoft.com/office/powerpoint/2010/main" val="4181968757"/>
+                <p14:modId xmlns:p14="http://schemas.microsoft.com/office/powerpoint/2010/main" val="1763620127"/>
               </p:ext>
             </p:extLst>
           </p:nvPr>
@@ -22323,7 +22532,7 @@
                           <a:ea typeface="Calibri" panose="020F0502020204030204" pitchFamily="34" charset="0"/>
                           <a:cs typeface="Times New Roman" panose="02020603050405020304" pitchFamily="18" charset="0"/>
                         </a:rPr>
-                        <a:t>с </a:t>
+                        <a:t>со </a:t>
                       </a:r>
                       <a:r>
                         <a:rPr lang="ru-RU" sz="1400" b="0" dirty="0">
@@ -23209,8 +23418,8 @@
           </a:p>
         </p:txBody>
       </p:sp>
-      <mc:AlternateContent xmlns:mc="http://schemas.openxmlformats.org/markup-compatibility/2006" xmlns:a14="http://schemas.microsoft.com/office/drawing/2010/main">
-        <mc:Choice Requires="a14">
+      <mc:AlternateContent xmlns:mc="http://schemas.openxmlformats.org/markup-compatibility/2006">
+        <mc:Choice xmlns:a14="http://schemas.microsoft.com/office/drawing/2010/main" Requires="a14">
           <p:graphicFrame>
             <p:nvGraphicFramePr>
               <p:cNvPr id="8" name="Content Placeholder 7"/>
@@ -23221,7 +23430,7 @@
                 <p:ph sz="half" idx="1"/>
                 <p:extLst>
                   <p:ext uri="{D42A27DB-BD31-4B8C-83A1-F6EECF244321}">
-                    <p14:modId xmlns:p14="http://schemas.microsoft.com/office/powerpoint/2010/main" val="2339098842"/>
+                    <p14:modId xmlns:p14="http://schemas.microsoft.com/office/powerpoint/2010/main" val="1826369147"/>
                   </p:ext>
                 </p:extLst>
               </p:nvPr>
@@ -23413,7 +23622,7 @@
                               <a:ea typeface="Calibri" panose="020F0502020204030204" pitchFamily="34" charset="0"/>
                               <a:cs typeface="Times New Roman" panose="02020603050405020304" pitchFamily="18" charset="0"/>
                             </a:rPr>
-                            <a:t>с </a:t>
+                            <a:t>со </a:t>
                           </a:r>
                           <a:r>
                             <a:rPr lang="ru-RU" sz="1200" b="0" dirty="0">
@@ -24405,7 +24614,7 @@
             </a:graphic>
           </p:graphicFrame>
         </mc:Choice>
-        <mc:Fallback xmlns="">
+        <mc:Fallback>
           <p:graphicFrame>
             <p:nvGraphicFramePr>
               <p:cNvPr id="8" name="Content Placeholder 7"/>
@@ -24416,7 +24625,7 @@
                 <p:ph sz="half" idx="1"/>
                 <p:extLst>
                   <p:ext uri="{D42A27DB-BD31-4B8C-83A1-F6EECF244321}">
-                    <p14:modId xmlns:p14="http://schemas.microsoft.com/office/powerpoint/2010/main" val="2339098842"/>
+                    <p14:modId xmlns:p14="http://schemas.microsoft.com/office/powerpoint/2010/main" val="1826369147"/>
                   </p:ext>
                 </p:extLst>
               </p:nvPr>
@@ -24608,7 +24817,7 @@
                               <a:ea typeface="Calibri" panose="020F0502020204030204" pitchFamily="34" charset="0"/>
                               <a:cs typeface="Times New Roman" panose="02020603050405020304" pitchFamily="18" charset="0"/>
                             </a:rPr>
-                            <a:t>с </a:t>
+                            <a:t>со </a:t>
                           </a:r>
                           <a:r>
                             <a:rPr lang="ru-RU" sz="1200" b="0" dirty="0">
@@ -25569,8 +25778,8 @@
           </a:p>
         </p:txBody>
       </p:sp>
-      <mc:AlternateContent xmlns:mc="http://schemas.openxmlformats.org/markup-compatibility/2006" xmlns:a14="http://schemas.microsoft.com/office/drawing/2010/main">
-        <mc:Choice Requires="a14">
+      <mc:AlternateContent xmlns:mc="http://schemas.openxmlformats.org/markup-compatibility/2006">
+        <mc:Choice xmlns:a14="http://schemas.microsoft.com/office/drawing/2010/main" Requires="a14">
           <p:sp>
             <p:nvSpPr>
               <p:cNvPr id="10" name="Content Placeholder 2"/>
@@ -25719,8 +25928,8 @@
                   <a:t>задач </a:t>
                 </a:r>
                 <a:r>
-                  <a:rPr lang="ru-RU" sz="2900" dirty="0"/>
-                  <a:t>с </a:t>
+                  <a:rPr lang="ru-RU" sz="2900" dirty="0" smtClean="0"/>
+                  <a:t>со </a:t>
                 </a:r>
                 <a:r>
                   <a:rPr lang="ru-RU" sz="2900" b="1" dirty="0">
@@ -25950,7 +26159,7 @@
             </p:txBody>
           </p:sp>
         </mc:Choice>
-        <mc:Fallback xmlns="">
+        <mc:Fallback>
           <p:sp>
             <p:nvSpPr>
               <p:cNvPr id="10" name="Content Placeholder 2"/>
@@ -26121,8 +26330,8 @@
           </a:p>
         </p:txBody>
       </p:sp>
-      <mc:AlternateContent xmlns:mc="http://schemas.openxmlformats.org/markup-compatibility/2006" xmlns:a14="http://schemas.microsoft.com/office/drawing/2010/main">
-        <mc:Choice Requires="a14">
+      <mc:AlternateContent xmlns:mc="http://schemas.openxmlformats.org/markup-compatibility/2006">
+        <mc:Choice xmlns:a14="http://schemas.microsoft.com/office/drawing/2010/main" Requires="a14">
           <p:graphicFrame>
             <p:nvGraphicFramePr>
               <p:cNvPr id="3" name="Table 2"/>
@@ -26132,7 +26341,7 @@
               <p:nvPr>
                 <p:extLst>
                   <p:ext uri="{D42A27DB-BD31-4B8C-83A1-F6EECF244321}">
-                    <p14:modId xmlns:p14="http://schemas.microsoft.com/office/powerpoint/2010/main" val="3400946240"/>
+                    <p14:modId xmlns:p14="http://schemas.microsoft.com/office/powerpoint/2010/main" val="2955585692"/>
                   </p:ext>
                 </p:extLst>
               </p:nvPr>
@@ -26324,7 +26533,7 @@
                               <a:ea typeface="Calibri" panose="020F0502020204030204" pitchFamily="34" charset="0"/>
                               <a:cs typeface="Times New Roman" panose="02020603050405020304" pitchFamily="18" charset="0"/>
                             </a:rPr>
-                            <a:t>с </a:t>
+                            <a:t>со </a:t>
                           </a:r>
                           <a:r>
                             <a:rPr lang="ru-RU" sz="1200" b="0" dirty="0">
@@ -27316,7 +27525,7 @@
             </a:graphic>
           </p:graphicFrame>
         </mc:Choice>
-        <mc:Fallback xmlns="">
+        <mc:Fallback>
           <p:graphicFrame>
             <p:nvGraphicFramePr>
               <p:cNvPr id="3" name="Table 2"/>
@@ -27326,7 +27535,7 @@
               <p:nvPr>
                 <p:extLst>
                   <p:ext uri="{D42A27DB-BD31-4B8C-83A1-F6EECF244321}">
-                    <p14:modId xmlns:p14="http://schemas.microsoft.com/office/powerpoint/2010/main" val="3400946240"/>
+                    <p14:modId xmlns:p14="http://schemas.microsoft.com/office/powerpoint/2010/main" val="2955585692"/>
                   </p:ext>
                 </p:extLst>
               </p:nvPr>
@@ -27518,7 +27727,7 @@
                               <a:ea typeface="Calibri" panose="020F0502020204030204" pitchFamily="34" charset="0"/>
                               <a:cs typeface="Times New Roman" panose="02020603050405020304" pitchFamily="18" charset="0"/>
                             </a:rPr>
-                            <a:t>с </a:t>
+                            <a:t>со </a:t>
                           </a:r>
                           <a:r>
                             <a:rPr lang="ru-RU" sz="1200" b="0" dirty="0">
@@ -28516,8 +28725,8 @@
           </a:p>
         </p:txBody>
       </p:sp>
-      <mc:AlternateContent xmlns:mc="http://schemas.openxmlformats.org/markup-compatibility/2006" xmlns:a14="http://schemas.microsoft.com/office/drawing/2010/main">
-        <mc:Choice Requires="a14">
+      <mc:AlternateContent xmlns:mc="http://schemas.openxmlformats.org/markup-compatibility/2006">
+        <mc:Choice xmlns:a14="http://schemas.microsoft.com/office/drawing/2010/main" Requires="a14">
           <p:graphicFrame>
             <p:nvGraphicFramePr>
               <p:cNvPr id="9" name="Table 8"/>
@@ -28527,7 +28736,7 @@
               <p:nvPr>
                 <p:extLst>
                   <p:ext uri="{D42A27DB-BD31-4B8C-83A1-F6EECF244321}">
-                    <p14:modId xmlns:p14="http://schemas.microsoft.com/office/powerpoint/2010/main" val="963604755"/>
+                    <p14:modId xmlns:p14="http://schemas.microsoft.com/office/powerpoint/2010/main" val="658497711"/>
                   </p:ext>
                 </p:extLst>
               </p:nvPr>
@@ -29434,7 +29643,7 @@
                               </a:solidFill>
                               <a:effectLst/>
                             </a:rPr>
-                            <a:t>с </a:t>
+                            <a:t>со </a:t>
                           </a:r>
                           <a:r>
                             <a:rPr lang="ru-RU" sz="1400" b="0" dirty="0">
@@ -31405,7 +31614,7 @@
             </a:graphic>
           </p:graphicFrame>
         </mc:Choice>
-        <mc:Fallback xmlns="">
+        <mc:Fallback>
           <p:graphicFrame>
             <p:nvGraphicFramePr>
               <p:cNvPr id="9" name="Table 8"/>
@@ -31415,7 +31624,7 @@
               <p:nvPr>
                 <p:extLst>
                   <p:ext uri="{D42A27DB-BD31-4B8C-83A1-F6EECF244321}">
-                    <p14:modId xmlns:p14="http://schemas.microsoft.com/office/powerpoint/2010/main" val="963604755"/>
+                    <p14:modId xmlns:p14="http://schemas.microsoft.com/office/powerpoint/2010/main" val="658497711"/>
                   </p:ext>
                 </p:extLst>
               </p:nvPr>
@@ -32179,7 +32388,7 @@
                               </a:solidFill>
                               <a:effectLst/>
                             </a:rPr>
-                            <a:t>с </a:t>
+                            <a:t>со </a:t>
                           </a:r>
                           <a:r>
                             <a:rPr lang="ru-RU" sz="1400" b="0" dirty="0">
@@ -33665,8 +33874,8 @@
           </p:graphicFrame>
         </mc:Fallback>
       </mc:AlternateContent>
-      <mc:AlternateContent xmlns:mc="http://schemas.openxmlformats.org/markup-compatibility/2006" xmlns:a14="http://schemas.microsoft.com/office/drawing/2010/main">
-        <mc:Choice Requires="a14">
+      <mc:AlternateContent xmlns:mc="http://schemas.openxmlformats.org/markup-compatibility/2006">
+        <mc:Choice xmlns:a14="http://schemas.microsoft.com/office/drawing/2010/main" Requires="a14">
           <p:graphicFrame>
             <p:nvGraphicFramePr>
               <p:cNvPr id="10" name="Table 9"/>
@@ -33676,7 +33885,7 @@
               <p:nvPr>
                 <p:extLst>
                   <p:ext uri="{D42A27DB-BD31-4B8C-83A1-F6EECF244321}">
-                    <p14:modId xmlns:p14="http://schemas.microsoft.com/office/powerpoint/2010/main" val="2759901175"/>
+                    <p14:modId xmlns:p14="http://schemas.microsoft.com/office/powerpoint/2010/main" val="1807078839"/>
                   </p:ext>
                 </p:extLst>
               </p:nvPr>
@@ -34601,7 +34810,7 @@
                               <a:ea typeface="Calibri" panose="020F0502020204030204" pitchFamily="34" charset="0"/>
                               <a:cs typeface="Times New Roman" panose="02020603050405020304" pitchFamily="18" charset="0"/>
                             </a:rPr>
-                            <a:t>с </a:t>
+                            <a:t>со </a:t>
                           </a:r>
                           <a:r>
                             <a:rPr lang="ru-RU" sz="1400" b="0" dirty="0">
@@ -36569,7 +36778,7 @@
             </a:graphic>
           </p:graphicFrame>
         </mc:Choice>
-        <mc:Fallback xmlns="">
+        <mc:Fallback>
           <p:graphicFrame>
             <p:nvGraphicFramePr>
               <p:cNvPr id="10" name="Table 9"/>
@@ -36579,7 +36788,7 @@
               <p:nvPr>
                 <p:extLst>
                   <p:ext uri="{D42A27DB-BD31-4B8C-83A1-F6EECF244321}">
-                    <p14:modId xmlns:p14="http://schemas.microsoft.com/office/powerpoint/2010/main" val="2759901175"/>
+                    <p14:modId xmlns:p14="http://schemas.microsoft.com/office/powerpoint/2010/main" val="1807078839"/>
                   </p:ext>
                 </p:extLst>
               </p:nvPr>
@@ -37340,7 +37549,7 @@
                               <a:ea typeface="Calibri" panose="020F0502020204030204" pitchFamily="34" charset="0"/>
                               <a:cs typeface="Times New Roman" panose="02020603050405020304" pitchFamily="18" charset="0"/>
                             </a:rPr>
-                            <a:t>с </a:t>
+                            <a:t>со </a:t>
                           </a:r>
                           <a:r>
                             <a:rPr lang="ru-RU" sz="1400" b="0" dirty="0">
@@ -39792,14 +40001,15 @@
             <a:spLocks noGrp="1"/>
           </p:cNvSpPr>
           <p:nvPr>
-            <p:ph type="ctrTitle"/>
+            <p:ph type="title"/>
           </p:nvPr>
         </p:nvSpPr>
         <p:spPr/>
         <p:txBody>
-          <a:bodyPr/>
+          <a:bodyPr anchor="ctr"/>
           <a:lstStyle/>
           <a:p>
+            <a:pPr algn="ctr"/>
             <a:r>
               <a:rPr lang="ru-RU" b="1" dirty="0" smtClean="0">
                 <a:solidFill>
@@ -39810,26 +40020,75 @@
               </a:rPr>
               <a:t>Заключение</a:t>
             </a:r>
-            <a:endParaRPr lang="ru-RU" b="1" dirty="0">
-              <a:solidFill>
-                <a:schemeClr val="accent5">
-                  <a:lumMod val="75000"/>
-                </a:schemeClr>
-              </a:solidFill>
-            </a:endParaRPr>
+            <a:endParaRPr lang="ru-RU" dirty="0"/>
+          </a:p>
+        </p:txBody>
+      </p:sp>
+      <p:sp>
+        <p:nvSpPr>
+          <p:cNvPr id="4" name="Footer Placeholder 3"/>
+          <p:cNvSpPr>
+            <a:spLocks noGrp="1"/>
+          </p:cNvSpPr>
+          <p:nvPr>
+            <p:ph type="ftr" sz="quarter" idx="11"/>
+          </p:nvPr>
+        </p:nvSpPr>
+        <p:spPr/>
+        <p:txBody>
+          <a:bodyPr/>
+          <a:lstStyle/>
+          <a:p>
+            <a:r>
+              <a:rPr lang="ru-RU" dirty="0" smtClean="0"/>
+              <a:t>Шуланкина Е. В. " Исследование подходов к решению задачи о 0-1 рюкзаке и задачи о неограниченном рюкзаке"</a:t>
+            </a:r>
+            <a:endParaRPr lang="en-US" dirty="0"/>
+          </a:p>
+        </p:txBody>
+      </p:sp>
+      <p:sp>
+        <p:nvSpPr>
+          <p:cNvPr id="5" name="Slide Number Placeholder 4"/>
+          <p:cNvSpPr>
+            <a:spLocks noGrp="1"/>
+          </p:cNvSpPr>
+          <p:nvPr>
+            <p:ph type="sldNum" sz="quarter" idx="12"/>
+          </p:nvPr>
+        </p:nvSpPr>
+        <p:spPr/>
+        <p:txBody>
+          <a:bodyPr/>
+          <a:lstStyle/>
+          <a:p>
+            <a:fld id="{D57F1E4F-1CFF-5643-939E-217C01CDF565}" type="slidenum">
+              <a:rPr lang="en-US" smtClean="0"/>
+              <a:pPr/>
+              <a:t>37</a:t>
+            </a:fld>
+            <a:endParaRPr lang="en-US" dirty="0"/>
           </a:p>
         </p:txBody>
       </p:sp>
     </p:spTree>
     <p:extLst>
       <p:ext uri="{BB962C8B-B14F-4D97-AF65-F5344CB8AC3E}">
-        <p14:creationId xmlns:p14="http://schemas.microsoft.com/office/powerpoint/2010/main" val="1883362810"/>
+        <p14:creationId xmlns:p14="http://schemas.microsoft.com/office/powerpoint/2010/main" val="127014901"/>
       </p:ext>
     </p:extLst>
   </p:cSld>
   <p:clrMapOvr>
     <a:masterClrMapping/>
   </p:clrMapOvr>
+  <mc:AlternateContent xmlns:mc="http://schemas.openxmlformats.org/markup-compatibility/2006" xmlns:p14="http://schemas.microsoft.com/office/powerpoint/2010/main">
+    <mc:Choice Requires="p14">
+      <p:transition spd="slow" p14:dur="2000"/>
+    </mc:Choice>
+    <mc:Fallback xmlns="">
+      <p:transition spd="slow"/>
+    </mc:Fallback>
+  </mc:AlternateContent>
   <p:timing>
     <p:tnLst>
       <p:par>
@@ -39962,15 +40221,7 @@
             </a:pPr>
             <a:r>
               <a:rPr lang="ru-RU" sz="2000" smtClean="0"/>
-              <a:t>Проведен</a:t>
-            </a:r>
-            <a:r>
-              <a:rPr lang="ru-RU" sz="2000" smtClean="0"/>
-              <a:t>ы эксперименты </a:t>
-            </a:r>
-            <a:r>
-              <a:rPr lang="ru-RU" sz="2000" smtClean="0"/>
-              <a:t>по </a:t>
+              <a:t>Проведены эксперименты по </a:t>
             </a:r>
             <a:r>
               <a:rPr lang="ru-RU" sz="2000" dirty="0" smtClean="0"/>
@@ -40347,6 +40598,34 @@
           </a:p>
         </p:txBody>
       </p:sp>
+      <p:sp>
+        <p:nvSpPr>
+          <p:cNvPr id="3" name="Footer Placeholder 3"/>
+          <p:cNvSpPr>
+            <a:spLocks noGrp="1"/>
+          </p:cNvSpPr>
+          <p:nvPr>
+            <p:ph type="ftr" sz="quarter" idx="11"/>
+          </p:nvPr>
+        </p:nvSpPr>
+        <p:spPr>
+          <a:xfrm>
+            <a:off x="4038600" y="6356350"/>
+            <a:ext cx="4114800" cy="365125"/>
+          </a:xfrm>
+        </p:spPr>
+        <p:txBody>
+          <a:bodyPr/>
+          <a:lstStyle/>
+          <a:p>
+            <a:r>
+              <a:rPr lang="ru-RU" dirty="0" smtClean="0"/>
+              <a:t>Шуланкина Е. В. " Исследование подходов к решению задачи о 0-1 рюкзаке и задачи о неограниченном рюкзаке"</a:t>
+            </a:r>
+            <a:endParaRPr lang="en-US" dirty="0"/>
+          </a:p>
+        </p:txBody>
+      </p:sp>
     </p:spTree>
     <p:extLst>
       <p:ext uri="{BB962C8B-B14F-4D97-AF65-F5344CB8AC3E}">
@@ -40427,15 +40706,7 @@
             </a:r>
             <a:r>
               <a:rPr lang="ru-RU" dirty="0" smtClean="0"/>
-              <a:t>(среди исследуемых) </a:t>
-            </a:r>
-            <a:r>
-              <a:rPr lang="ru-RU" dirty="0"/>
-              <a:t>алгоритма </a:t>
-            </a:r>
-            <a:r>
-              <a:rPr lang="ru-RU" dirty="0" smtClean="0"/>
-              <a:t>решения </a:t>
+              <a:t>(среди исследуемых) алгоритма решения </a:t>
             </a:r>
             <a:r>
               <a:rPr lang="ru-RU" dirty="0"/>

</xml_diff>